<commit_message>
main PC mods - design flow image
</commit_message>
<xml_diff>
--- a/designFlow.pptx
+++ b/designFlow.pptx
@@ -243,7 +243,7 @@
           <a:p>
             <a:fld id="{4A187F1C-3376-4EE1-AC20-F4D505C2DB27}" type="datetimeFigureOut">
               <a:rPr lang="pt-BR" smtClean="0"/>
-              <a:t>19/06/2020</a:t>
+              <a:t>29/06/2020</a:t>
             </a:fld>
             <a:endParaRPr lang="pt-BR"/>
           </a:p>
@@ -413,7 +413,7 @@
           <a:p>
             <a:fld id="{4A187F1C-3376-4EE1-AC20-F4D505C2DB27}" type="datetimeFigureOut">
               <a:rPr lang="pt-BR" smtClean="0"/>
-              <a:t>19/06/2020</a:t>
+              <a:t>29/06/2020</a:t>
             </a:fld>
             <a:endParaRPr lang="pt-BR"/>
           </a:p>
@@ -593,7 +593,7 @@
           <a:p>
             <a:fld id="{4A187F1C-3376-4EE1-AC20-F4D505C2DB27}" type="datetimeFigureOut">
               <a:rPr lang="pt-BR" smtClean="0"/>
-              <a:t>19/06/2020</a:t>
+              <a:t>29/06/2020</a:t>
             </a:fld>
             <a:endParaRPr lang="pt-BR"/>
           </a:p>
@@ -763,7 +763,7 @@
           <a:p>
             <a:fld id="{4A187F1C-3376-4EE1-AC20-F4D505C2DB27}" type="datetimeFigureOut">
               <a:rPr lang="pt-BR" smtClean="0"/>
-              <a:t>19/06/2020</a:t>
+              <a:t>29/06/2020</a:t>
             </a:fld>
             <a:endParaRPr lang="pt-BR"/>
           </a:p>
@@ -1007,7 +1007,7 @@
           <a:p>
             <a:fld id="{4A187F1C-3376-4EE1-AC20-F4D505C2DB27}" type="datetimeFigureOut">
               <a:rPr lang="pt-BR" smtClean="0"/>
-              <a:t>19/06/2020</a:t>
+              <a:t>29/06/2020</a:t>
             </a:fld>
             <a:endParaRPr lang="pt-BR"/>
           </a:p>
@@ -1239,7 +1239,7 @@
           <a:p>
             <a:fld id="{4A187F1C-3376-4EE1-AC20-F4D505C2DB27}" type="datetimeFigureOut">
               <a:rPr lang="pt-BR" smtClean="0"/>
-              <a:t>19/06/2020</a:t>
+              <a:t>29/06/2020</a:t>
             </a:fld>
             <a:endParaRPr lang="pt-BR"/>
           </a:p>
@@ -1606,7 +1606,7 @@
           <a:p>
             <a:fld id="{4A187F1C-3376-4EE1-AC20-F4D505C2DB27}" type="datetimeFigureOut">
               <a:rPr lang="pt-BR" smtClean="0"/>
-              <a:t>19/06/2020</a:t>
+              <a:t>29/06/2020</a:t>
             </a:fld>
             <a:endParaRPr lang="pt-BR"/>
           </a:p>
@@ -1724,7 +1724,7 @@
           <a:p>
             <a:fld id="{4A187F1C-3376-4EE1-AC20-F4D505C2DB27}" type="datetimeFigureOut">
               <a:rPr lang="pt-BR" smtClean="0"/>
-              <a:t>19/06/2020</a:t>
+              <a:t>29/06/2020</a:t>
             </a:fld>
             <a:endParaRPr lang="pt-BR"/>
           </a:p>
@@ -1819,7 +1819,7 @@
           <a:p>
             <a:fld id="{4A187F1C-3376-4EE1-AC20-F4D505C2DB27}" type="datetimeFigureOut">
               <a:rPr lang="pt-BR" smtClean="0"/>
-              <a:t>19/06/2020</a:t>
+              <a:t>29/06/2020</a:t>
             </a:fld>
             <a:endParaRPr lang="pt-BR"/>
           </a:p>
@@ -2096,7 +2096,7 @@
           <a:p>
             <a:fld id="{4A187F1C-3376-4EE1-AC20-F4D505C2DB27}" type="datetimeFigureOut">
               <a:rPr lang="pt-BR" smtClean="0"/>
-              <a:t>19/06/2020</a:t>
+              <a:t>29/06/2020</a:t>
             </a:fld>
             <a:endParaRPr lang="pt-BR"/>
           </a:p>
@@ -2353,7 +2353,7 @@
           <a:p>
             <a:fld id="{4A187F1C-3376-4EE1-AC20-F4D505C2DB27}" type="datetimeFigureOut">
               <a:rPr lang="pt-BR" smtClean="0"/>
-              <a:t>19/06/2020</a:t>
+              <a:t>29/06/2020</a:t>
             </a:fld>
             <a:endParaRPr lang="pt-BR"/>
           </a:p>
@@ -2566,7 +2566,7 @@
           <a:p>
             <a:fld id="{4A187F1C-3376-4EE1-AC20-F4D505C2DB27}" type="datetimeFigureOut">
               <a:rPr lang="pt-BR" smtClean="0"/>
-              <a:t>19/06/2020</a:t>
+              <a:t>29/06/2020</a:t>
             </a:fld>
             <a:endParaRPr lang="pt-BR"/>
           </a:p>
@@ -2971,61 +2971,553 @@
           <a:chExt cx="0" cy="0"/>
         </a:xfrm>
       </p:grpSpPr>
-      <p:sp>
-        <p:nvSpPr>
-          <p:cNvPr id="175" name="Rectangle 174">
+      <p:grpSp>
+        <p:nvGrpSpPr>
+          <p:cNvPr id="2" name="Group 1">
             <a:extLst>
               <a:ext uri="{FF2B5EF4-FFF2-40B4-BE49-F238E27FC236}">
-                <a16:creationId xmlns:a16="http://schemas.microsoft.com/office/drawing/2014/main" id="{FA62EBD9-4DEC-4F5D-8A7C-DA28CEB45F41}"/>
+                <a16:creationId xmlns:a16="http://schemas.microsoft.com/office/drawing/2014/main" id="{298609D0-5B2A-411E-82AA-4552E8F08336}"/>
               </a:ext>
             </a:extLst>
           </p:cNvPr>
-          <p:cNvSpPr/>
+          <p:cNvGrpSpPr/>
           <p:nvPr/>
-        </p:nvSpPr>
-        <p:spPr>
+        </p:nvGrpSpPr>
+        <p:grpSpPr>
           <a:xfrm>
-            <a:off x="152225" y="976285"/>
-            <a:ext cx="1613948" cy="2306402"/>
+            <a:off x="152225" y="156035"/>
+            <a:ext cx="4035572" cy="4018936"/>
+            <a:chOff x="152225" y="156035"/>
+            <a:chExt cx="4035572" cy="4018936"/>
           </a:xfrm>
-          <a:prstGeom prst="rect">
-            <a:avLst/>
-          </a:prstGeom>
-          <a:solidFill>
-            <a:schemeClr val="accent1">
-              <a:lumMod val="40000"/>
-              <a:lumOff val="60000"/>
-            </a:schemeClr>
-          </a:solidFill>
-        </p:spPr>
-        <p:style>
-          <a:lnRef idx="2">
-            <a:schemeClr val="accent1">
-              <a:shade val="50000"/>
-            </a:schemeClr>
-          </a:lnRef>
-          <a:fillRef idx="1">
-            <a:schemeClr val="accent1"/>
-          </a:fillRef>
-          <a:effectRef idx="0">
-            <a:schemeClr val="accent1"/>
-          </a:effectRef>
-          <a:fontRef idx="minor">
-            <a:schemeClr val="lt1"/>
-          </a:fontRef>
-        </p:style>
-        <p:txBody>
-          <a:bodyPr rot="0" spcFirstLastPara="0" vertOverflow="overflow" horzOverflow="overflow" vert="horz" wrap="square" lIns="63305" tIns="31652" rIns="63305" bIns="31652" numCol="1" spcCol="0" rtlCol="0" fromWordArt="0" anchor="b" anchorCtr="0" forceAA="0" compatLnSpc="1">
-            <a:prstTxWarp prst="textNoShape">
+        </p:grpSpPr>
+        <p:sp>
+          <p:nvSpPr>
+            <p:cNvPr id="175" name="Rectangle 174">
+              <a:extLst>
+                <a:ext uri="{FF2B5EF4-FFF2-40B4-BE49-F238E27FC236}">
+                  <a16:creationId xmlns:a16="http://schemas.microsoft.com/office/drawing/2014/main" id="{FA62EBD9-4DEC-4F5D-8A7C-DA28CEB45F41}"/>
+                </a:ext>
+              </a:extLst>
+            </p:cNvPr>
+            <p:cNvSpPr/>
+            <p:nvPr/>
+          </p:nvSpPr>
+          <p:spPr>
+            <a:xfrm>
+              <a:off x="152225" y="976285"/>
+              <a:ext cx="1613948" cy="2306402"/>
+            </a:xfrm>
+            <a:prstGeom prst="rect">
               <a:avLst/>
-            </a:prstTxWarp>
-            <a:noAutofit/>
-          </a:bodyPr>
-          <a:lstStyle/>
-          <a:p>
-            <a:pPr algn="ctr"/>
-            <a:r>
-              <a:rPr lang="pt-BR" sz="1246" dirty="0">
+            </a:prstGeom>
+            <a:solidFill>
+              <a:schemeClr val="accent1">
+                <a:lumMod val="40000"/>
+                <a:lumOff val="60000"/>
+              </a:schemeClr>
+            </a:solidFill>
+          </p:spPr>
+          <p:style>
+            <a:lnRef idx="2">
+              <a:schemeClr val="accent1">
+                <a:shade val="50000"/>
+              </a:schemeClr>
+            </a:lnRef>
+            <a:fillRef idx="1">
+              <a:schemeClr val="accent1"/>
+            </a:fillRef>
+            <a:effectRef idx="0">
+              <a:schemeClr val="accent1"/>
+            </a:effectRef>
+            <a:fontRef idx="minor">
+              <a:schemeClr val="lt1"/>
+            </a:fontRef>
+          </p:style>
+          <p:txBody>
+            <a:bodyPr rot="0" spcFirstLastPara="0" vertOverflow="overflow" horzOverflow="overflow" vert="horz" wrap="square" lIns="63305" tIns="31652" rIns="63305" bIns="31652" numCol="1" spcCol="0" rtlCol="0" fromWordArt="0" anchor="b" anchorCtr="0" forceAA="0" compatLnSpc="1">
+              <a:prstTxWarp prst="textNoShape">
+                <a:avLst/>
+              </a:prstTxWarp>
+              <a:noAutofit/>
+            </a:bodyPr>
+            <a:lstStyle/>
+            <a:p>
+              <a:pPr algn="ctr"/>
+              <a:r>
+                <a:rPr lang="pt-BR" sz="1246" dirty="0">
+                  <a:ln w="0"/>
+                  <a:solidFill>
+                    <a:schemeClr val="tx1"/>
+                  </a:solidFill>
+                  <a:effectLst>
+                    <a:outerShdw blurRad="38100" dist="19050" dir="2700000" algn="tl" rotWithShape="0">
+                      <a:schemeClr val="dk1">
+                        <a:alpha val="40000"/>
+                      </a:schemeClr>
+                    </a:outerShdw>
+                  </a:effectLst>
+                </a:rPr>
+                <a:t>Virtuoso </a:t>
+              </a:r>
+              <a:r>
+                <a:rPr lang="pt-BR" sz="1246" dirty="0" err="1">
+                  <a:ln w="0"/>
+                  <a:solidFill>
+                    <a:schemeClr val="tx1"/>
+                  </a:solidFill>
+                  <a:effectLst>
+                    <a:outerShdw blurRad="38100" dist="19050" dir="2700000" algn="tl" rotWithShape="0">
+                      <a:schemeClr val="dk1">
+                        <a:alpha val="40000"/>
+                      </a:schemeClr>
+                    </a:outerShdw>
+                  </a:effectLst>
+                </a:rPr>
+                <a:t>Cadence</a:t>
+              </a:r>
+              <a:endParaRPr lang="pt-BR" sz="1246" dirty="0"/>
+            </a:p>
+          </p:txBody>
+        </p:sp>
+        <p:sp>
+          <p:nvSpPr>
+            <p:cNvPr id="176" name="Rectangle 175">
+              <a:extLst>
+                <a:ext uri="{FF2B5EF4-FFF2-40B4-BE49-F238E27FC236}">
+                  <a16:creationId xmlns:a16="http://schemas.microsoft.com/office/drawing/2014/main" id="{25B1AD7F-9A01-47FC-8E7D-5A8B750C6077}"/>
+                </a:ext>
+              </a:extLst>
+            </p:cNvPr>
+            <p:cNvSpPr/>
+            <p:nvPr/>
+          </p:nvSpPr>
+          <p:spPr>
+            <a:xfrm>
+              <a:off x="158648" y="554842"/>
+              <a:ext cx="1613947" cy="242955"/>
+            </a:xfrm>
+            <a:prstGeom prst="rect">
+              <a:avLst/>
+            </a:prstGeom>
+            <a:ln>
+              <a:noFill/>
+            </a:ln>
+          </p:spPr>
+          <p:style>
+            <a:lnRef idx="2">
+              <a:schemeClr val="accent3">
+                <a:shade val="50000"/>
+              </a:schemeClr>
+            </a:lnRef>
+            <a:fillRef idx="1">
+              <a:schemeClr val="accent3"/>
+            </a:fillRef>
+            <a:effectRef idx="0">
+              <a:schemeClr val="accent3"/>
+            </a:effectRef>
+            <a:fontRef idx="minor">
+              <a:schemeClr val="lt1"/>
+            </a:fontRef>
+          </p:style>
+          <p:txBody>
+            <a:bodyPr rot="0" spcFirstLastPara="0" vertOverflow="overflow" horzOverflow="overflow" vert="horz" wrap="square" lIns="63305" tIns="31652" rIns="63305" bIns="31652" numCol="1" spcCol="0" rtlCol="0" fromWordArt="0" anchor="t" anchorCtr="0" forceAA="0" compatLnSpc="1">
+              <a:prstTxWarp prst="textNoShape">
+                <a:avLst/>
+              </a:prstTxWarp>
+              <a:noAutofit/>
+            </a:bodyPr>
+            <a:lstStyle/>
+            <a:p>
+              <a:pPr algn="ctr"/>
+              <a:r>
+                <a:rPr lang="pt-BR" sz="1246" dirty="0">
+                  <a:ln w="0"/>
+                  <a:solidFill>
+                    <a:schemeClr val="tx1"/>
+                  </a:solidFill>
+                  <a:effectLst>
+                    <a:outerShdw blurRad="38100" dist="19050" dir="2700000" algn="tl" rotWithShape="0">
+                      <a:schemeClr val="dk1">
+                        <a:alpha val="40000"/>
+                      </a:schemeClr>
+                    </a:outerShdw>
+                  </a:effectLst>
+                </a:rPr>
+                <a:t>Transistor </a:t>
+              </a:r>
+              <a:r>
+                <a:rPr lang="pt-BR" sz="1246" dirty="0" err="1">
+                  <a:ln w="0"/>
+                  <a:solidFill>
+                    <a:schemeClr val="tx1"/>
+                  </a:solidFill>
+                  <a:effectLst>
+                    <a:outerShdw blurRad="38100" dist="19050" dir="2700000" algn="tl" rotWithShape="0">
+                      <a:schemeClr val="dk1">
+                        <a:alpha val="40000"/>
+                      </a:schemeClr>
+                    </a:outerShdw>
+                  </a:effectLst>
+                </a:rPr>
+                <a:t>Sizing</a:t>
+              </a:r>
+              <a:endParaRPr lang="pt-BR" sz="1246" dirty="0"/>
+            </a:p>
+          </p:txBody>
+        </p:sp>
+        <p:cxnSp>
+          <p:nvCxnSpPr>
+            <p:cNvPr id="178" name="Straight Arrow Connector 177">
+              <a:extLst>
+                <a:ext uri="{FF2B5EF4-FFF2-40B4-BE49-F238E27FC236}">
+                  <a16:creationId xmlns:a16="http://schemas.microsoft.com/office/drawing/2014/main" id="{A41855B3-C01F-4BCB-BBA2-0E0F4F8D6646}"/>
+                </a:ext>
+              </a:extLst>
+            </p:cNvPr>
+            <p:cNvCxnSpPr>
+              <a:cxnSpLocks/>
+              <a:stCxn id="180" idx="2"/>
+              <a:endCxn id="176" idx="0"/>
+            </p:cNvCxnSpPr>
+            <p:nvPr/>
+          </p:nvCxnSpPr>
+          <p:spPr>
+            <a:xfrm>
+              <a:off x="959902" y="398990"/>
+              <a:ext cx="5720" cy="155852"/>
+            </a:xfrm>
+            <a:prstGeom prst="straightConnector1">
+              <a:avLst/>
+            </a:prstGeom>
+            <a:ln w="38100">
+              <a:solidFill>
+                <a:srgbClr val="FF0000"/>
+              </a:solidFill>
+              <a:prstDash val="sysDot"/>
+              <a:tailEnd type="triangle"/>
+            </a:ln>
+          </p:spPr>
+          <p:style>
+            <a:lnRef idx="1">
+              <a:schemeClr val="accent1"/>
+            </a:lnRef>
+            <a:fillRef idx="0">
+              <a:schemeClr val="accent1"/>
+            </a:fillRef>
+            <a:effectRef idx="0">
+              <a:schemeClr val="accent1"/>
+            </a:effectRef>
+            <a:fontRef idx="minor">
+              <a:schemeClr val="tx1"/>
+            </a:fontRef>
+          </p:style>
+        </p:cxnSp>
+        <p:cxnSp>
+          <p:nvCxnSpPr>
+            <p:cNvPr id="179" name="Straight Arrow Connector 178">
+              <a:extLst>
+                <a:ext uri="{FF2B5EF4-FFF2-40B4-BE49-F238E27FC236}">
+                  <a16:creationId xmlns:a16="http://schemas.microsoft.com/office/drawing/2014/main" id="{03E11B52-6C6F-4CF3-9FFF-2571985AED5B}"/>
+                </a:ext>
+              </a:extLst>
+            </p:cNvPr>
+            <p:cNvCxnSpPr>
+              <a:cxnSpLocks/>
+              <a:stCxn id="176" idx="2"/>
+              <a:endCxn id="175" idx="0"/>
+            </p:cNvCxnSpPr>
+            <p:nvPr/>
+          </p:nvCxnSpPr>
+          <p:spPr>
+            <a:xfrm flipH="1">
+              <a:off x="959199" y="797797"/>
+              <a:ext cx="6423" cy="178488"/>
+            </a:xfrm>
+            <a:prstGeom prst="straightConnector1">
+              <a:avLst/>
+            </a:prstGeom>
+            <a:ln w="38100">
+              <a:solidFill>
+                <a:srgbClr val="FF0000"/>
+              </a:solidFill>
+              <a:prstDash val="sysDot"/>
+              <a:tailEnd type="triangle"/>
+            </a:ln>
+          </p:spPr>
+          <p:style>
+            <a:lnRef idx="1">
+              <a:schemeClr val="accent1"/>
+            </a:lnRef>
+            <a:fillRef idx="0">
+              <a:schemeClr val="accent1"/>
+            </a:fillRef>
+            <a:effectRef idx="0">
+              <a:schemeClr val="accent1"/>
+            </a:effectRef>
+            <a:fontRef idx="minor">
+              <a:schemeClr val="tx1"/>
+            </a:fontRef>
+          </p:style>
+        </p:cxnSp>
+        <p:sp>
+          <p:nvSpPr>
+            <p:cNvPr id="180" name="Rectangle 179">
+              <a:extLst>
+                <a:ext uri="{FF2B5EF4-FFF2-40B4-BE49-F238E27FC236}">
+                  <a16:creationId xmlns:a16="http://schemas.microsoft.com/office/drawing/2014/main" id="{8B826E18-75A7-4B43-A96F-D3C3ECFC1BDC}"/>
+                </a:ext>
+              </a:extLst>
+            </p:cNvPr>
+            <p:cNvSpPr/>
+            <p:nvPr/>
+          </p:nvSpPr>
+          <p:spPr>
+            <a:xfrm>
+              <a:off x="152928" y="156035"/>
+              <a:ext cx="1613948" cy="242955"/>
+            </a:xfrm>
+            <a:prstGeom prst="rect">
+              <a:avLst/>
+            </a:prstGeom>
+            <a:ln>
+              <a:noFill/>
+            </a:ln>
+          </p:spPr>
+          <p:style>
+            <a:lnRef idx="2">
+              <a:schemeClr val="accent3">
+                <a:shade val="50000"/>
+              </a:schemeClr>
+            </a:lnRef>
+            <a:fillRef idx="1">
+              <a:schemeClr val="accent3"/>
+            </a:fillRef>
+            <a:effectRef idx="0">
+              <a:schemeClr val="accent3"/>
+            </a:effectRef>
+            <a:fontRef idx="minor">
+              <a:schemeClr val="lt1"/>
+            </a:fontRef>
+          </p:style>
+          <p:txBody>
+            <a:bodyPr rot="0" spcFirstLastPara="0" vertOverflow="overflow" horzOverflow="overflow" vert="horz" wrap="square" lIns="63305" tIns="31652" rIns="63305" bIns="31652" numCol="1" spcCol="0" rtlCol="0" fromWordArt="0" anchor="ctr" anchorCtr="0" forceAA="0" compatLnSpc="1">
+              <a:prstTxWarp prst="textNoShape">
+                <a:avLst/>
+              </a:prstTxWarp>
+              <a:noAutofit/>
+            </a:bodyPr>
+            <a:lstStyle/>
+            <a:p>
+              <a:pPr algn="ctr"/>
+              <a:r>
+                <a:rPr lang="pt-BR" sz="1246" dirty="0" err="1">
+                  <a:ln w="0"/>
+                  <a:solidFill>
+                    <a:schemeClr val="tx1"/>
+                  </a:solidFill>
+                  <a:effectLst>
+                    <a:outerShdw blurRad="38100" dist="19050" dir="2700000" algn="tl" rotWithShape="0">
+                      <a:schemeClr val="dk1">
+                        <a:alpha val="40000"/>
+                      </a:schemeClr>
+                    </a:outerShdw>
+                  </a:effectLst>
+                </a:rPr>
+                <a:t>Choice</a:t>
+              </a:r>
+              <a:r>
+                <a:rPr lang="pt-BR" sz="1246" dirty="0">
+                  <a:ln w="0"/>
+                  <a:solidFill>
+                    <a:schemeClr val="tx1"/>
+                  </a:solidFill>
+                  <a:effectLst>
+                    <a:outerShdw blurRad="38100" dist="19050" dir="2700000" algn="tl" rotWithShape="0">
+                      <a:schemeClr val="dk1">
+                        <a:alpha val="40000"/>
+                      </a:schemeClr>
+                    </a:outerShdw>
+                  </a:effectLst>
+                </a:rPr>
+                <a:t> </a:t>
+              </a:r>
+              <a:r>
+                <a:rPr lang="pt-BR" sz="1246" dirty="0" err="1">
+                  <a:ln w="0"/>
+                  <a:solidFill>
+                    <a:schemeClr val="tx1"/>
+                  </a:solidFill>
+                  <a:effectLst>
+                    <a:outerShdw blurRad="38100" dist="19050" dir="2700000" algn="tl" rotWithShape="0">
+                      <a:schemeClr val="dk1">
+                        <a:alpha val="40000"/>
+                      </a:schemeClr>
+                    </a:outerShdw>
+                  </a:effectLst>
+                </a:rPr>
+                <a:t>of</a:t>
+              </a:r>
+              <a:r>
+                <a:rPr lang="pt-BR" sz="1246" dirty="0">
+                  <a:ln w="0"/>
+                  <a:solidFill>
+                    <a:schemeClr val="tx1"/>
+                  </a:solidFill>
+                  <a:effectLst>
+                    <a:outerShdw blurRad="38100" dist="19050" dir="2700000" algn="tl" rotWithShape="0">
+                      <a:schemeClr val="dk1">
+                        <a:alpha val="40000"/>
+                      </a:schemeClr>
+                    </a:outerShdw>
+                  </a:effectLst>
+                </a:rPr>
+                <a:t> </a:t>
+              </a:r>
+              <a:r>
+                <a:rPr lang="pt-BR" sz="1246" dirty="0" err="1">
+                  <a:ln w="0"/>
+                  <a:solidFill>
+                    <a:schemeClr val="tx1"/>
+                  </a:solidFill>
+                  <a:effectLst>
+                    <a:outerShdw blurRad="38100" dist="19050" dir="2700000" algn="tl" rotWithShape="0">
+                      <a:schemeClr val="dk1">
+                        <a:alpha val="40000"/>
+                      </a:schemeClr>
+                    </a:outerShdw>
+                  </a:effectLst>
+                </a:rPr>
+                <a:t>circuits</a:t>
+              </a:r>
+              <a:endParaRPr lang="pt-BR" sz="1246" dirty="0"/>
+            </a:p>
+          </p:txBody>
+        </p:sp>
+        <p:sp>
+          <p:nvSpPr>
+            <p:cNvPr id="181" name="Rectangle 180">
+              <a:extLst>
+                <a:ext uri="{FF2B5EF4-FFF2-40B4-BE49-F238E27FC236}">
+                  <a16:creationId xmlns:a16="http://schemas.microsoft.com/office/drawing/2014/main" id="{40FDBE2E-1E4D-4862-80C1-AFBDC38B54DD}"/>
+                </a:ext>
+              </a:extLst>
+            </p:cNvPr>
+            <p:cNvSpPr/>
+            <p:nvPr/>
+          </p:nvSpPr>
+          <p:spPr>
+            <a:xfrm>
+              <a:off x="300022" y="1705284"/>
+              <a:ext cx="1305018" cy="1285463"/>
+            </a:xfrm>
+            <a:prstGeom prst="rect">
+              <a:avLst/>
+            </a:prstGeom>
+          </p:spPr>
+          <p:style>
+            <a:lnRef idx="2">
+              <a:schemeClr val="accent1">
+                <a:shade val="50000"/>
+              </a:schemeClr>
+            </a:lnRef>
+            <a:fillRef idx="1">
+              <a:schemeClr val="accent1"/>
+            </a:fillRef>
+            <a:effectRef idx="0">
+              <a:schemeClr val="accent1"/>
+            </a:effectRef>
+            <a:fontRef idx="minor">
+              <a:schemeClr val="lt1"/>
+            </a:fontRef>
+          </p:style>
+          <p:txBody>
+            <a:bodyPr rot="0" spcFirstLastPara="0" vertOverflow="overflow" horzOverflow="overflow" vert="horz" wrap="square" lIns="63305" tIns="31652" rIns="63305" bIns="31652" numCol="1" spcCol="0" rtlCol="0" fromWordArt="0" anchor="t" anchorCtr="0" forceAA="0" compatLnSpc="1">
+              <a:prstTxWarp prst="textNoShape">
+                <a:avLst/>
+              </a:prstTxWarp>
+              <a:noAutofit/>
+            </a:bodyPr>
+            <a:lstStyle/>
+            <a:p>
+              <a:pPr algn="ctr"/>
+              <a:r>
+                <a:rPr lang="pt-BR" sz="1246" dirty="0"/>
+                <a:t>Layout Design</a:t>
+              </a:r>
+            </a:p>
+          </p:txBody>
+        </p:sp>
+        <p:sp>
+          <p:nvSpPr>
+            <p:cNvPr id="182" name="Rectangle 181">
+              <a:extLst>
+                <a:ext uri="{FF2B5EF4-FFF2-40B4-BE49-F238E27FC236}">
+                  <a16:creationId xmlns:a16="http://schemas.microsoft.com/office/drawing/2014/main" id="{C17789A8-4A03-4E95-9C4F-0208A2481D4E}"/>
+                </a:ext>
+              </a:extLst>
+            </p:cNvPr>
+            <p:cNvSpPr/>
+            <p:nvPr/>
+          </p:nvSpPr>
+          <p:spPr>
+            <a:xfrm>
+              <a:off x="499704" y="1982614"/>
+              <a:ext cx="918990" cy="254677"/>
+            </a:xfrm>
+            <a:prstGeom prst="rect">
+              <a:avLst/>
+            </a:prstGeom>
+            <a:solidFill>
+              <a:schemeClr val="accent1">
+                <a:lumMod val="60000"/>
+                <a:lumOff val="40000"/>
+              </a:schemeClr>
+            </a:solidFill>
+          </p:spPr>
+          <p:style>
+            <a:lnRef idx="2">
+              <a:schemeClr val="accent1">
+                <a:shade val="50000"/>
+              </a:schemeClr>
+            </a:lnRef>
+            <a:fillRef idx="1">
+              <a:schemeClr val="accent1"/>
+            </a:fillRef>
+            <a:effectRef idx="0">
+              <a:schemeClr val="accent1"/>
+            </a:effectRef>
+            <a:fontRef idx="minor">
+              <a:schemeClr val="lt1"/>
+            </a:fontRef>
+          </p:style>
+          <p:txBody>
+            <a:bodyPr rot="0" spcFirstLastPara="0" vertOverflow="overflow" horzOverflow="overflow" vert="horz" wrap="square" lIns="63305" tIns="31652" rIns="63305" bIns="31652" numCol="1" spcCol="0" rtlCol="0" fromWordArt="0" anchor="ctr" anchorCtr="0" forceAA="0" compatLnSpc="1">
+              <a:prstTxWarp prst="textNoShape">
+                <a:avLst/>
+              </a:prstTxWarp>
+              <a:noAutofit/>
+            </a:bodyPr>
+            <a:lstStyle/>
+            <a:p>
+              <a:pPr algn="ctr"/>
+              <a:r>
+                <a:rPr lang="pt-BR" sz="1246" dirty="0" err="1">
+                  <a:ln w="0"/>
+                  <a:solidFill>
+                    <a:schemeClr val="tx1"/>
+                  </a:solidFill>
+                  <a:effectLst>
+                    <a:outerShdw blurRad="38100" dist="19050" dir="2700000" algn="tl" rotWithShape="0">
+                      <a:schemeClr val="dk1">
+                        <a:alpha val="40000"/>
+                      </a:schemeClr>
+                    </a:outerShdw>
+                  </a:effectLst>
+                </a:rPr>
+                <a:t>Schematic</a:t>
+              </a:r>
+              <a:endParaRPr lang="pt-BR" sz="1246" dirty="0">
                 <a:ln w="0"/>
                 <a:solidFill>
                   <a:schemeClr val="tx1"/>
@@ -3037,11 +3529,80 @@
                     </a:schemeClr>
                   </a:outerShdw>
                 </a:effectLst>
-              </a:rPr>
-              <a:t>Virtuoso </a:t>
-            </a:r>
-            <a:r>
-              <a:rPr lang="pt-BR" sz="1246" dirty="0" err="1">
+              </a:endParaRPr>
+            </a:p>
+          </p:txBody>
+        </p:sp>
+        <p:sp>
+          <p:nvSpPr>
+            <p:cNvPr id="183" name="Rectangle 182">
+              <a:extLst>
+                <a:ext uri="{FF2B5EF4-FFF2-40B4-BE49-F238E27FC236}">
+                  <a16:creationId xmlns:a16="http://schemas.microsoft.com/office/drawing/2014/main" id="{8FA2F7D5-385C-477C-A1F9-BA7DB678DCCF}"/>
+                </a:ext>
+              </a:extLst>
+            </p:cNvPr>
+            <p:cNvSpPr/>
+            <p:nvPr/>
+          </p:nvSpPr>
+          <p:spPr>
+            <a:xfrm>
+              <a:off x="503559" y="2323473"/>
+              <a:ext cx="911279" cy="249058"/>
+            </a:xfrm>
+            <a:prstGeom prst="rect">
+              <a:avLst/>
+            </a:prstGeom>
+            <a:solidFill>
+              <a:schemeClr val="accent1">
+                <a:lumMod val="60000"/>
+                <a:lumOff val="40000"/>
+              </a:schemeClr>
+            </a:solidFill>
+          </p:spPr>
+          <p:style>
+            <a:lnRef idx="2">
+              <a:schemeClr val="accent1">
+                <a:shade val="50000"/>
+              </a:schemeClr>
+            </a:lnRef>
+            <a:fillRef idx="1">
+              <a:schemeClr val="accent1"/>
+            </a:fillRef>
+            <a:effectRef idx="0">
+              <a:schemeClr val="accent1"/>
+            </a:effectRef>
+            <a:fontRef idx="minor">
+              <a:schemeClr val="lt1"/>
+            </a:fontRef>
+          </p:style>
+          <p:txBody>
+            <a:bodyPr rot="0" spcFirstLastPara="0" vertOverflow="overflow" horzOverflow="overflow" vert="horz" wrap="square" lIns="63305" tIns="31652" rIns="63305" bIns="31652" numCol="1" spcCol="0" rtlCol="0" fromWordArt="0" anchor="ctr" anchorCtr="0" forceAA="0" compatLnSpc="1">
+              <a:prstTxWarp prst="textNoShape">
+                <a:avLst/>
+              </a:prstTxWarp>
+              <a:noAutofit/>
+            </a:bodyPr>
+            <a:lstStyle/>
+            <a:p>
+              <a:pPr algn="ctr"/>
+              <a:r>
+                <a:rPr lang="pt-BR" sz="1246" dirty="0" err="1">
+                  <a:ln w="0"/>
+                  <a:solidFill>
+                    <a:schemeClr val="tx1"/>
+                  </a:solidFill>
+                  <a:effectLst>
+                    <a:outerShdw blurRad="38100" dist="19050" dir="2700000" algn="tl" rotWithShape="0">
+                      <a:schemeClr val="dk1">
+                        <a:alpha val="40000"/>
+                      </a:schemeClr>
+                    </a:outerShdw>
+                  </a:effectLst>
+                </a:rPr>
+                <a:t>Symbol</a:t>
+              </a:r>
+              <a:endParaRPr lang="pt-BR" sz="1246" dirty="0">
                 <a:ln w="0"/>
                 <a:solidFill>
                   <a:schemeClr val="tx1"/>
@@ -3053,1559 +3614,1019 @@
                     </a:schemeClr>
                   </a:outerShdw>
                 </a:effectLst>
-              </a:rPr>
-              <a:t>Cadence</a:t>
-            </a:r>
-            <a:endParaRPr lang="pt-BR" sz="1246" dirty="0"/>
-          </a:p>
-        </p:txBody>
-      </p:sp>
-      <p:sp>
-        <p:nvSpPr>
-          <p:cNvPr id="176" name="Rectangle 175">
-            <a:extLst>
-              <a:ext uri="{FF2B5EF4-FFF2-40B4-BE49-F238E27FC236}">
-                <a16:creationId xmlns:a16="http://schemas.microsoft.com/office/drawing/2014/main" id="{25B1AD7F-9A01-47FC-8E7D-5A8B750C6077}"/>
-              </a:ext>
-            </a:extLst>
-          </p:cNvPr>
-          <p:cNvSpPr/>
-          <p:nvPr/>
-        </p:nvSpPr>
-        <p:spPr>
-          <a:xfrm>
-            <a:off x="158648" y="554842"/>
-            <a:ext cx="1613947" cy="242955"/>
-          </a:xfrm>
-          <a:prstGeom prst="rect">
-            <a:avLst/>
-          </a:prstGeom>
-          <a:ln>
-            <a:noFill/>
-          </a:ln>
-        </p:spPr>
-        <p:style>
-          <a:lnRef idx="2">
-            <a:schemeClr val="accent3">
-              <a:shade val="50000"/>
-            </a:schemeClr>
-          </a:lnRef>
-          <a:fillRef idx="1">
-            <a:schemeClr val="accent3"/>
-          </a:fillRef>
-          <a:effectRef idx="0">
-            <a:schemeClr val="accent3"/>
-          </a:effectRef>
-          <a:fontRef idx="minor">
-            <a:schemeClr val="lt1"/>
-          </a:fontRef>
-        </p:style>
-        <p:txBody>
-          <a:bodyPr rot="0" spcFirstLastPara="0" vertOverflow="overflow" horzOverflow="overflow" vert="horz" wrap="square" lIns="63305" tIns="31652" rIns="63305" bIns="31652" numCol="1" spcCol="0" rtlCol="0" fromWordArt="0" anchor="t" anchorCtr="0" forceAA="0" compatLnSpc="1">
-            <a:prstTxWarp prst="textNoShape">
+              </a:endParaRPr>
+            </a:p>
+          </p:txBody>
+        </p:sp>
+        <p:sp>
+          <p:nvSpPr>
+            <p:cNvPr id="184" name="Rectangle 183">
+              <a:extLst>
+                <a:ext uri="{FF2B5EF4-FFF2-40B4-BE49-F238E27FC236}">
+                  <a16:creationId xmlns:a16="http://schemas.microsoft.com/office/drawing/2014/main" id="{07A10301-12F1-4939-8313-EF42E8891E2D}"/>
+                </a:ext>
+              </a:extLst>
+            </p:cNvPr>
+            <p:cNvSpPr/>
+            <p:nvPr/>
+          </p:nvSpPr>
+          <p:spPr>
+            <a:xfrm>
+              <a:off x="503558" y="2640631"/>
+              <a:ext cx="911279" cy="249058"/>
+            </a:xfrm>
+            <a:prstGeom prst="rect">
               <a:avLst/>
-            </a:prstTxWarp>
-            <a:noAutofit/>
-          </a:bodyPr>
-          <a:lstStyle/>
-          <a:p>
-            <a:pPr algn="ctr"/>
-            <a:r>
-              <a:rPr lang="pt-BR" sz="1246" dirty="0">
-                <a:ln w="0"/>
-                <a:solidFill>
-                  <a:schemeClr val="tx1"/>
-                </a:solidFill>
-                <a:effectLst>
-                  <a:outerShdw blurRad="38100" dist="19050" dir="2700000" algn="tl" rotWithShape="0">
-                    <a:schemeClr val="dk1">
-                      <a:alpha val="40000"/>
-                    </a:schemeClr>
-                  </a:outerShdw>
-                </a:effectLst>
-              </a:rPr>
-              <a:t>Transistor </a:t>
-            </a:r>
-            <a:r>
-              <a:rPr lang="pt-BR" sz="1246" dirty="0" err="1">
-                <a:ln w="0"/>
-                <a:solidFill>
-                  <a:schemeClr val="tx1"/>
-                </a:solidFill>
-                <a:effectLst>
-                  <a:outerShdw blurRad="38100" dist="19050" dir="2700000" algn="tl" rotWithShape="0">
-                    <a:schemeClr val="dk1">
-                      <a:alpha val="40000"/>
-                    </a:schemeClr>
-                  </a:outerShdw>
-                </a:effectLst>
-              </a:rPr>
-              <a:t>Sizing</a:t>
-            </a:r>
-            <a:endParaRPr lang="pt-BR" sz="1246" dirty="0"/>
-          </a:p>
-        </p:txBody>
-      </p:sp>
-      <p:cxnSp>
-        <p:nvCxnSpPr>
-          <p:cNvPr id="178" name="Straight Arrow Connector 177">
-            <a:extLst>
-              <a:ext uri="{FF2B5EF4-FFF2-40B4-BE49-F238E27FC236}">
-                <a16:creationId xmlns:a16="http://schemas.microsoft.com/office/drawing/2014/main" id="{A41855B3-C01F-4BCB-BBA2-0E0F4F8D6646}"/>
-              </a:ext>
-            </a:extLst>
-          </p:cNvPr>
-          <p:cNvCxnSpPr>
-            <a:cxnSpLocks/>
-            <a:stCxn id="180" idx="2"/>
-            <a:endCxn id="176" idx="0"/>
-          </p:cNvCxnSpPr>
-          <p:nvPr/>
-        </p:nvCxnSpPr>
-        <p:spPr>
-          <a:xfrm>
-            <a:off x="959902" y="398990"/>
-            <a:ext cx="5720" cy="155852"/>
-          </a:xfrm>
-          <a:prstGeom prst="straightConnector1">
-            <a:avLst/>
-          </a:prstGeom>
-          <a:ln w="38100">
-            <a:solidFill>
-              <a:srgbClr val="FF0000"/>
-            </a:solidFill>
-            <a:prstDash val="sysDot"/>
-            <a:tailEnd type="triangle"/>
-          </a:ln>
-        </p:spPr>
-        <p:style>
-          <a:lnRef idx="1">
-            <a:schemeClr val="accent1"/>
-          </a:lnRef>
-          <a:fillRef idx="0">
-            <a:schemeClr val="accent1"/>
-          </a:fillRef>
-          <a:effectRef idx="0">
-            <a:schemeClr val="accent1"/>
-          </a:effectRef>
-          <a:fontRef idx="minor">
-            <a:schemeClr val="tx1"/>
-          </a:fontRef>
-        </p:style>
-      </p:cxnSp>
-      <p:cxnSp>
-        <p:nvCxnSpPr>
-          <p:cNvPr id="179" name="Straight Arrow Connector 178">
-            <a:extLst>
-              <a:ext uri="{FF2B5EF4-FFF2-40B4-BE49-F238E27FC236}">
-                <a16:creationId xmlns:a16="http://schemas.microsoft.com/office/drawing/2014/main" id="{03E11B52-6C6F-4CF3-9FFF-2571985AED5B}"/>
-              </a:ext>
-            </a:extLst>
-          </p:cNvPr>
-          <p:cNvCxnSpPr>
-            <a:cxnSpLocks/>
-            <a:stCxn id="176" idx="2"/>
-            <a:endCxn id="175" idx="0"/>
-          </p:cNvCxnSpPr>
-          <p:nvPr/>
-        </p:nvCxnSpPr>
-        <p:spPr>
-          <a:xfrm flipH="1">
-            <a:off x="959199" y="797797"/>
-            <a:ext cx="6423" cy="178488"/>
-          </a:xfrm>
-          <a:prstGeom prst="straightConnector1">
-            <a:avLst/>
-          </a:prstGeom>
-          <a:ln w="38100">
-            <a:solidFill>
-              <a:srgbClr val="FF0000"/>
-            </a:solidFill>
-            <a:prstDash val="sysDot"/>
-            <a:tailEnd type="triangle"/>
-          </a:ln>
-        </p:spPr>
-        <p:style>
-          <a:lnRef idx="1">
-            <a:schemeClr val="accent1"/>
-          </a:lnRef>
-          <a:fillRef idx="0">
-            <a:schemeClr val="accent1"/>
-          </a:fillRef>
-          <a:effectRef idx="0">
-            <a:schemeClr val="accent1"/>
-          </a:effectRef>
-          <a:fontRef idx="minor">
-            <a:schemeClr val="tx1"/>
-          </a:fontRef>
-        </p:style>
-      </p:cxnSp>
-      <p:sp>
-        <p:nvSpPr>
-          <p:cNvPr id="180" name="Rectangle 179">
-            <a:extLst>
-              <a:ext uri="{FF2B5EF4-FFF2-40B4-BE49-F238E27FC236}">
-                <a16:creationId xmlns:a16="http://schemas.microsoft.com/office/drawing/2014/main" id="{8B826E18-75A7-4B43-A96F-D3C3ECFC1BDC}"/>
-              </a:ext>
-            </a:extLst>
-          </p:cNvPr>
-          <p:cNvSpPr/>
-          <p:nvPr/>
-        </p:nvSpPr>
-        <p:spPr>
-          <a:xfrm>
-            <a:off x="152928" y="156035"/>
-            <a:ext cx="1613948" cy="242955"/>
-          </a:xfrm>
-          <a:prstGeom prst="rect">
-            <a:avLst/>
-          </a:prstGeom>
-          <a:ln>
-            <a:noFill/>
-          </a:ln>
-        </p:spPr>
-        <p:style>
-          <a:lnRef idx="2">
-            <a:schemeClr val="accent3">
-              <a:shade val="50000"/>
-            </a:schemeClr>
-          </a:lnRef>
-          <a:fillRef idx="1">
-            <a:schemeClr val="accent3"/>
-          </a:fillRef>
-          <a:effectRef idx="0">
-            <a:schemeClr val="accent3"/>
-          </a:effectRef>
-          <a:fontRef idx="minor">
-            <a:schemeClr val="lt1"/>
-          </a:fontRef>
-        </p:style>
-        <p:txBody>
-          <a:bodyPr rot="0" spcFirstLastPara="0" vertOverflow="overflow" horzOverflow="overflow" vert="horz" wrap="square" lIns="63305" tIns="31652" rIns="63305" bIns="31652" numCol="1" spcCol="0" rtlCol="0" fromWordArt="0" anchor="ctr" anchorCtr="0" forceAA="0" compatLnSpc="1">
-            <a:prstTxWarp prst="textNoShape">
-              <a:avLst/>
-            </a:prstTxWarp>
-            <a:noAutofit/>
-          </a:bodyPr>
-          <a:lstStyle/>
-          <a:p>
-            <a:pPr algn="ctr"/>
-            <a:r>
-              <a:rPr lang="pt-BR" sz="1246" dirty="0" err="1">
-                <a:ln w="0"/>
-                <a:solidFill>
-                  <a:schemeClr val="tx1"/>
-                </a:solidFill>
-                <a:effectLst>
-                  <a:outerShdw blurRad="38100" dist="19050" dir="2700000" algn="tl" rotWithShape="0">
-                    <a:schemeClr val="dk1">
-                      <a:alpha val="40000"/>
-                    </a:schemeClr>
-                  </a:outerShdw>
-                </a:effectLst>
-              </a:rPr>
-              <a:t>Choice</a:t>
-            </a:r>
-            <a:r>
-              <a:rPr lang="pt-BR" sz="1246" dirty="0">
-                <a:ln w="0"/>
-                <a:solidFill>
-                  <a:schemeClr val="tx1"/>
-                </a:solidFill>
-                <a:effectLst>
-                  <a:outerShdw blurRad="38100" dist="19050" dir="2700000" algn="tl" rotWithShape="0">
-                    <a:schemeClr val="dk1">
-                      <a:alpha val="40000"/>
-                    </a:schemeClr>
-                  </a:outerShdw>
-                </a:effectLst>
-              </a:rPr>
-              <a:t> </a:t>
-            </a:r>
-            <a:r>
-              <a:rPr lang="pt-BR" sz="1246" dirty="0" err="1">
-                <a:ln w="0"/>
-                <a:solidFill>
-                  <a:schemeClr val="tx1"/>
-                </a:solidFill>
-                <a:effectLst>
-                  <a:outerShdw blurRad="38100" dist="19050" dir="2700000" algn="tl" rotWithShape="0">
-                    <a:schemeClr val="dk1">
-                      <a:alpha val="40000"/>
-                    </a:schemeClr>
-                  </a:outerShdw>
-                </a:effectLst>
-              </a:rPr>
-              <a:t>of</a:t>
-            </a:r>
-            <a:r>
-              <a:rPr lang="pt-BR" sz="1246" dirty="0">
-                <a:ln w="0"/>
-                <a:solidFill>
-                  <a:schemeClr val="tx1"/>
-                </a:solidFill>
-                <a:effectLst>
-                  <a:outerShdw blurRad="38100" dist="19050" dir="2700000" algn="tl" rotWithShape="0">
-                    <a:schemeClr val="dk1">
-                      <a:alpha val="40000"/>
-                    </a:schemeClr>
-                  </a:outerShdw>
-                </a:effectLst>
-              </a:rPr>
-              <a:t> </a:t>
-            </a:r>
-            <a:r>
-              <a:rPr lang="pt-BR" sz="1246" dirty="0" err="1">
-                <a:ln w="0"/>
-                <a:solidFill>
-                  <a:schemeClr val="tx1"/>
-                </a:solidFill>
-                <a:effectLst>
-                  <a:outerShdw blurRad="38100" dist="19050" dir="2700000" algn="tl" rotWithShape="0">
-                    <a:schemeClr val="dk1">
-                      <a:alpha val="40000"/>
-                    </a:schemeClr>
-                  </a:outerShdw>
-                </a:effectLst>
-              </a:rPr>
-              <a:t>circuits</a:t>
-            </a:r>
-            <a:endParaRPr lang="pt-BR" sz="1246" dirty="0"/>
-          </a:p>
-        </p:txBody>
-      </p:sp>
-      <p:sp>
-        <p:nvSpPr>
-          <p:cNvPr id="181" name="Rectangle 180">
-            <a:extLst>
-              <a:ext uri="{FF2B5EF4-FFF2-40B4-BE49-F238E27FC236}">
-                <a16:creationId xmlns:a16="http://schemas.microsoft.com/office/drawing/2014/main" id="{40FDBE2E-1E4D-4862-80C1-AFBDC38B54DD}"/>
-              </a:ext>
-            </a:extLst>
-          </p:cNvPr>
-          <p:cNvSpPr/>
-          <p:nvPr/>
-        </p:nvSpPr>
-        <p:spPr>
-          <a:xfrm>
-            <a:off x="300022" y="1705284"/>
-            <a:ext cx="1305018" cy="1285463"/>
-          </a:xfrm>
-          <a:prstGeom prst="rect">
-            <a:avLst/>
-          </a:prstGeom>
-        </p:spPr>
-        <p:style>
-          <a:lnRef idx="2">
-            <a:schemeClr val="accent1">
-              <a:shade val="50000"/>
-            </a:schemeClr>
-          </a:lnRef>
-          <a:fillRef idx="1">
-            <a:schemeClr val="accent1"/>
-          </a:fillRef>
-          <a:effectRef idx="0">
-            <a:schemeClr val="accent1"/>
-          </a:effectRef>
-          <a:fontRef idx="minor">
-            <a:schemeClr val="lt1"/>
-          </a:fontRef>
-        </p:style>
-        <p:txBody>
-          <a:bodyPr rot="0" spcFirstLastPara="0" vertOverflow="overflow" horzOverflow="overflow" vert="horz" wrap="square" lIns="63305" tIns="31652" rIns="63305" bIns="31652" numCol="1" spcCol="0" rtlCol="0" fromWordArt="0" anchor="t" anchorCtr="0" forceAA="0" compatLnSpc="1">
-            <a:prstTxWarp prst="textNoShape">
-              <a:avLst/>
-            </a:prstTxWarp>
-            <a:noAutofit/>
-          </a:bodyPr>
-          <a:lstStyle/>
-          <a:p>
-            <a:pPr algn="ctr"/>
-            <a:r>
-              <a:rPr lang="pt-BR" sz="1246" dirty="0"/>
-              <a:t>Layout Design</a:t>
-            </a:r>
-          </a:p>
-        </p:txBody>
-      </p:sp>
-      <p:sp>
-        <p:nvSpPr>
-          <p:cNvPr id="182" name="Rectangle 181">
-            <a:extLst>
-              <a:ext uri="{FF2B5EF4-FFF2-40B4-BE49-F238E27FC236}">
-                <a16:creationId xmlns:a16="http://schemas.microsoft.com/office/drawing/2014/main" id="{C17789A8-4A03-4E95-9C4F-0208A2481D4E}"/>
-              </a:ext>
-            </a:extLst>
-          </p:cNvPr>
-          <p:cNvSpPr/>
-          <p:nvPr/>
-        </p:nvSpPr>
-        <p:spPr>
-          <a:xfrm>
-            <a:off x="499704" y="1982614"/>
-            <a:ext cx="918990" cy="254677"/>
-          </a:xfrm>
-          <a:prstGeom prst="rect">
-            <a:avLst/>
-          </a:prstGeom>
-          <a:solidFill>
-            <a:schemeClr val="accent1">
-              <a:lumMod val="60000"/>
-              <a:lumOff val="40000"/>
-            </a:schemeClr>
-          </a:solidFill>
-        </p:spPr>
-        <p:style>
-          <a:lnRef idx="2">
-            <a:schemeClr val="accent1">
-              <a:shade val="50000"/>
-            </a:schemeClr>
-          </a:lnRef>
-          <a:fillRef idx="1">
-            <a:schemeClr val="accent1"/>
-          </a:fillRef>
-          <a:effectRef idx="0">
-            <a:schemeClr val="accent1"/>
-          </a:effectRef>
-          <a:fontRef idx="minor">
-            <a:schemeClr val="lt1"/>
-          </a:fontRef>
-        </p:style>
-        <p:txBody>
-          <a:bodyPr rot="0" spcFirstLastPara="0" vertOverflow="overflow" horzOverflow="overflow" vert="horz" wrap="square" lIns="63305" tIns="31652" rIns="63305" bIns="31652" numCol="1" spcCol="0" rtlCol="0" fromWordArt="0" anchor="ctr" anchorCtr="0" forceAA="0" compatLnSpc="1">
-            <a:prstTxWarp prst="textNoShape">
-              <a:avLst/>
-            </a:prstTxWarp>
-            <a:noAutofit/>
-          </a:bodyPr>
-          <a:lstStyle/>
-          <a:p>
-            <a:pPr algn="ctr"/>
-            <a:r>
-              <a:rPr lang="pt-BR" sz="1246" dirty="0" err="1">
-                <a:ln w="0"/>
-                <a:solidFill>
-                  <a:schemeClr val="tx1"/>
-                </a:solidFill>
-                <a:effectLst>
-                  <a:outerShdw blurRad="38100" dist="19050" dir="2700000" algn="tl" rotWithShape="0">
-                    <a:schemeClr val="dk1">
-                      <a:alpha val="40000"/>
-                    </a:schemeClr>
-                  </a:outerShdw>
-                </a:effectLst>
-              </a:rPr>
-              <a:t>Schematic</a:t>
-            </a:r>
-            <a:endParaRPr lang="pt-BR" sz="1246" dirty="0">
-              <a:ln w="0"/>
-              <a:solidFill>
-                <a:schemeClr val="tx1"/>
-              </a:solidFill>
-              <a:effectLst>
-                <a:outerShdw blurRad="38100" dist="19050" dir="2700000" algn="tl" rotWithShape="0">
-                  <a:schemeClr val="dk1">
-                    <a:alpha val="40000"/>
-                  </a:schemeClr>
-                </a:outerShdw>
-              </a:effectLst>
-            </a:endParaRPr>
-          </a:p>
-        </p:txBody>
-      </p:sp>
-      <p:sp>
-        <p:nvSpPr>
-          <p:cNvPr id="183" name="Rectangle 182">
-            <a:extLst>
-              <a:ext uri="{FF2B5EF4-FFF2-40B4-BE49-F238E27FC236}">
-                <a16:creationId xmlns:a16="http://schemas.microsoft.com/office/drawing/2014/main" id="{8FA2F7D5-385C-477C-A1F9-BA7DB678DCCF}"/>
-              </a:ext>
-            </a:extLst>
-          </p:cNvPr>
-          <p:cNvSpPr/>
-          <p:nvPr/>
-        </p:nvSpPr>
-        <p:spPr>
-          <a:xfrm>
-            <a:off x="503559" y="2323473"/>
-            <a:ext cx="911279" cy="249058"/>
-          </a:xfrm>
-          <a:prstGeom prst="rect">
-            <a:avLst/>
-          </a:prstGeom>
-          <a:solidFill>
-            <a:schemeClr val="accent1">
-              <a:lumMod val="60000"/>
-              <a:lumOff val="40000"/>
-            </a:schemeClr>
-          </a:solidFill>
-        </p:spPr>
-        <p:style>
-          <a:lnRef idx="2">
-            <a:schemeClr val="accent1">
-              <a:shade val="50000"/>
-            </a:schemeClr>
-          </a:lnRef>
-          <a:fillRef idx="1">
-            <a:schemeClr val="accent1"/>
-          </a:fillRef>
-          <a:effectRef idx="0">
-            <a:schemeClr val="accent1"/>
-          </a:effectRef>
-          <a:fontRef idx="minor">
-            <a:schemeClr val="lt1"/>
-          </a:fontRef>
-        </p:style>
-        <p:txBody>
-          <a:bodyPr rot="0" spcFirstLastPara="0" vertOverflow="overflow" horzOverflow="overflow" vert="horz" wrap="square" lIns="63305" tIns="31652" rIns="63305" bIns="31652" numCol="1" spcCol="0" rtlCol="0" fromWordArt="0" anchor="ctr" anchorCtr="0" forceAA="0" compatLnSpc="1">
-            <a:prstTxWarp prst="textNoShape">
-              <a:avLst/>
-            </a:prstTxWarp>
-            <a:noAutofit/>
-          </a:bodyPr>
-          <a:lstStyle/>
-          <a:p>
-            <a:pPr algn="ctr"/>
-            <a:r>
-              <a:rPr lang="pt-BR" sz="1246" dirty="0" err="1">
-                <a:ln w="0"/>
-                <a:solidFill>
-                  <a:schemeClr val="tx1"/>
-                </a:solidFill>
-                <a:effectLst>
-                  <a:outerShdw blurRad="38100" dist="19050" dir="2700000" algn="tl" rotWithShape="0">
-                    <a:schemeClr val="dk1">
-                      <a:alpha val="40000"/>
-                    </a:schemeClr>
-                  </a:outerShdw>
-                </a:effectLst>
-              </a:rPr>
-              <a:t>Symbol</a:t>
-            </a:r>
-            <a:endParaRPr lang="pt-BR" sz="1246" dirty="0">
-              <a:ln w="0"/>
-              <a:solidFill>
-                <a:schemeClr val="tx1"/>
-              </a:solidFill>
-              <a:effectLst>
-                <a:outerShdw blurRad="38100" dist="19050" dir="2700000" algn="tl" rotWithShape="0">
-                  <a:schemeClr val="dk1">
-                    <a:alpha val="40000"/>
-                  </a:schemeClr>
-                </a:outerShdw>
-              </a:effectLst>
-            </a:endParaRPr>
-          </a:p>
-        </p:txBody>
-      </p:sp>
-      <p:sp>
-        <p:nvSpPr>
-          <p:cNvPr id="184" name="Rectangle 183">
-            <a:extLst>
-              <a:ext uri="{FF2B5EF4-FFF2-40B4-BE49-F238E27FC236}">
-                <a16:creationId xmlns:a16="http://schemas.microsoft.com/office/drawing/2014/main" id="{07A10301-12F1-4939-8313-EF42E8891E2D}"/>
-              </a:ext>
-            </a:extLst>
-          </p:cNvPr>
-          <p:cNvSpPr/>
-          <p:nvPr/>
-        </p:nvSpPr>
-        <p:spPr>
-          <a:xfrm>
-            <a:off x="503558" y="2640631"/>
-            <a:ext cx="911279" cy="249058"/>
-          </a:xfrm>
-          <a:prstGeom prst="rect">
-            <a:avLst/>
-          </a:prstGeom>
-          <a:solidFill>
-            <a:schemeClr val="accent1">
-              <a:lumMod val="60000"/>
-              <a:lumOff val="40000"/>
-            </a:schemeClr>
-          </a:solidFill>
-        </p:spPr>
-        <p:style>
-          <a:lnRef idx="2">
-            <a:schemeClr val="accent1">
-              <a:shade val="50000"/>
-            </a:schemeClr>
-          </a:lnRef>
-          <a:fillRef idx="1">
-            <a:schemeClr val="accent1"/>
-          </a:fillRef>
-          <a:effectRef idx="0">
-            <a:schemeClr val="accent1"/>
-          </a:effectRef>
-          <a:fontRef idx="minor">
-            <a:schemeClr val="lt1"/>
-          </a:fontRef>
-        </p:style>
-        <p:txBody>
-          <a:bodyPr rot="0" spcFirstLastPara="0" vertOverflow="overflow" horzOverflow="overflow" vert="horz" wrap="square" lIns="63305" tIns="31652" rIns="63305" bIns="31652" numCol="1" spcCol="0" rtlCol="0" fromWordArt="0" anchor="ctr" anchorCtr="0" forceAA="0" compatLnSpc="1">
-            <a:prstTxWarp prst="textNoShape">
-              <a:avLst/>
-            </a:prstTxWarp>
-            <a:noAutofit/>
-          </a:bodyPr>
-          <a:lstStyle/>
-          <a:p>
-            <a:pPr algn="ctr"/>
-            <a:r>
-              <a:rPr lang="pt-BR" sz="1246" dirty="0">
-                <a:ln w="0"/>
-                <a:solidFill>
-                  <a:schemeClr val="tx1"/>
-                </a:solidFill>
-                <a:effectLst>
-                  <a:outerShdw blurRad="38100" dist="19050" dir="2700000" algn="tl" rotWithShape="0">
-                    <a:schemeClr val="dk1">
-                      <a:alpha val="40000"/>
-                    </a:schemeClr>
-                  </a:outerShdw>
-                </a:effectLst>
-              </a:rPr>
-              <a:t>Layout</a:t>
-            </a:r>
-            <a:endParaRPr lang="pt-BR" sz="1246" dirty="0"/>
-          </a:p>
-        </p:txBody>
-      </p:sp>
-      <p:sp>
-        <p:nvSpPr>
-          <p:cNvPr id="185" name="Rectangle 184">
-            <a:extLst>
-              <a:ext uri="{FF2B5EF4-FFF2-40B4-BE49-F238E27FC236}">
-                <a16:creationId xmlns:a16="http://schemas.microsoft.com/office/drawing/2014/main" id="{D6F515B4-6A9F-443E-9279-0C1B210B3CAD}"/>
-              </a:ext>
-            </a:extLst>
-          </p:cNvPr>
-          <p:cNvSpPr/>
-          <p:nvPr/>
-        </p:nvSpPr>
-        <p:spPr>
-          <a:xfrm>
-            <a:off x="152927" y="3368860"/>
-            <a:ext cx="1613948" cy="806111"/>
-          </a:xfrm>
-          <a:prstGeom prst="rect">
-            <a:avLst/>
-          </a:prstGeom>
-          <a:solidFill>
-            <a:schemeClr val="accent1">
-              <a:lumMod val="40000"/>
-              <a:lumOff val="60000"/>
-            </a:schemeClr>
-          </a:solidFill>
-        </p:spPr>
-        <p:style>
-          <a:lnRef idx="2">
-            <a:schemeClr val="accent1">
-              <a:shade val="50000"/>
-            </a:schemeClr>
-          </a:lnRef>
-          <a:fillRef idx="1">
-            <a:schemeClr val="accent1"/>
-          </a:fillRef>
-          <a:effectRef idx="0">
-            <a:schemeClr val="accent1"/>
-          </a:effectRef>
-          <a:fontRef idx="minor">
-            <a:schemeClr val="lt1"/>
-          </a:fontRef>
-        </p:style>
-        <p:txBody>
-          <a:bodyPr rot="0" spcFirstLastPara="0" vertOverflow="overflow" horzOverflow="overflow" vert="horz" wrap="square" lIns="63305" tIns="31652" rIns="63305" bIns="31652" numCol="1" spcCol="0" rtlCol="0" fromWordArt="0" anchor="b" anchorCtr="0" forceAA="0" compatLnSpc="1">
-            <a:prstTxWarp prst="textNoShape">
-              <a:avLst/>
-            </a:prstTxWarp>
-            <a:noAutofit/>
-          </a:bodyPr>
-          <a:lstStyle/>
-          <a:p>
-            <a:pPr algn="ctr"/>
-            <a:r>
-              <a:rPr lang="pt-BR" sz="1246" dirty="0" err="1">
-                <a:ln w="0"/>
-                <a:solidFill>
-                  <a:schemeClr val="tx1"/>
-                </a:solidFill>
-                <a:effectLst>
-                  <a:outerShdw blurRad="38100" dist="19050" dir="2700000" algn="tl" rotWithShape="0">
-                    <a:schemeClr val="dk1">
-                      <a:alpha val="40000"/>
-                    </a:schemeClr>
-                  </a:outerShdw>
-                </a:effectLst>
-              </a:rPr>
-              <a:t>Hspice</a:t>
-            </a:r>
-            <a:r>
-              <a:rPr lang="pt-BR" sz="1246" dirty="0">
-                <a:ln w="0"/>
-                <a:solidFill>
-                  <a:schemeClr val="tx1"/>
-                </a:solidFill>
-                <a:effectLst>
-                  <a:outerShdw blurRad="38100" dist="19050" dir="2700000" algn="tl" rotWithShape="0">
-                    <a:schemeClr val="dk1">
-                      <a:alpha val="40000"/>
-                    </a:schemeClr>
-                  </a:outerShdw>
-                </a:effectLst>
-              </a:rPr>
-              <a:t> </a:t>
-            </a:r>
-            <a:r>
-              <a:rPr lang="pt-BR" sz="1246" dirty="0" err="1">
-                <a:ln w="0"/>
-                <a:solidFill>
-                  <a:schemeClr val="tx1"/>
-                </a:solidFill>
-                <a:effectLst>
-                  <a:outerShdw blurRad="38100" dist="19050" dir="2700000" algn="tl" rotWithShape="0">
-                    <a:schemeClr val="dk1">
-                      <a:alpha val="40000"/>
-                    </a:schemeClr>
-                  </a:outerShdw>
-                </a:effectLst>
-              </a:rPr>
-              <a:t>Synopsys</a:t>
-            </a:r>
-            <a:endParaRPr lang="pt-BR" sz="1246" dirty="0"/>
-          </a:p>
-        </p:txBody>
-      </p:sp>
-      <p:sp>
-        <p:nvSpPr>
-          <p:cNvPr id="186" name="Rectangle 185">
-            <a:extLst>
-              <a:ext uri="{FF2B5EF4-FFF2-40B4-BE49-F238E27FC236}">
-                <a16:creationId xmlns:a16="http://schemas.microsoft.com/office/drawing/2014/main" id="{8EC55FF8-9DAD-4546-B7DB-DD2AD0D4D889}"/>
-              </a:ext>
-            </a:extLst>
-          </p:cNvPr>
-          <p:cNvSpPr/>
-          <p:nvPr/>
-        </p:nvSpPr>
-        <p:spPr>
-          <a:xfrm>
-            <a:off x="304582" y="3482040"/>
-            <a:ext cx="1310640" cy="443851"/>
-          </a:xfrm>
-          <a:prstGeom prst="rect">
-            <a:avLst/>
-          </a:prstGeom>
-        </p:spPr>
-        <p:style>
-          <a:lnRef idx="2">
-            <a:schemeClr val="accent1">
-              <a:shade val="50000"/>
-            </a:schemeClr>
-          </a:lnRef>
-          <a:fillRef idx="1">
-            <a:schemeClr val="accent1"/>
-          </a:fillRef>
-          <a:effectRef idx="0">
-            <a:schemeClr val="accent1"/>
-          </a:effectRef>
-          <a:fontRef idx="minor">
-            <a:schemeClr val="lt1"/>
-          </a:fontRef>
-        </p:style>
-        <p:txBody>
-          <a:bodyPr rot="0" spcFirstLastPara="0" vertOverflow="overflow" horzOverflow="overflow" vert="horz" wrap="square" lIns="63305" tIns="31652" rIns="63305" bIns="31652" numCol="1" spcCol="0" rtlCol="0" fromWordArt="0" anchor="t" anchorCtr="0" forceAA="0" compatLnSpc="1">
-            <a:prstTxWarp prst="textNoShape">
-              <a:avLst/>
-            </a:prstTxWarp>
-            <a:noAutofit/>
-          </a:bodyPr>
-          <a:lstStyle/>
-          <a:p>
-            <a:pPr algn="ctr"/>
-            <a:r>
-              <a:rPr lang="pt-BR" sz="1246" dirty="0" err="1"/>
-              <a:t>Process</a:t>
-            </a:r>
-            <a:r>
-              <a:rPr lang="pt-BR" sz="1246" dirty="0"/>
-              <a:t> </a:t>
-            </a:r>
-            <a:r>
-              <a:rPr lang="pt-BR" sz="1246" dirty="0" err="1"/>
-              <a:t>Variability</a:t>
-            </a:r>
-            <a:r>
-              <a:rPr lang="pt-BR" sz="1246" dirty="0"/>
-              <a:t> </a:t>
-            </a:r>
-            <a:r>
-              <a:rPr lang="pt-BR" sz="1246" dirty="0" err="1"/>
-              <a:t>Insertion</a:t>
-            </a:r>
-            <a:endParaRPr lang="pt-BR" sz="1246" dirty="0"/>
-          </a:p>
-        </p:txBody>
-      </p:sp>
-      <p:sp>
-        <p:nvSpPr>
-          <p:cNvPr id="187" name="Rectangle 186">
-            <a:extLst>
-              <a:ext uri="{FF2B5EF4-FFF2-40B4-BE49-F238E27FC236}">
-                <a16:creationId xmlns:a16="http://schemas.microsoft.com/office/drawing/2014/main" id="{2D6C6517-F0C4-42C7-BDCD-E69619161ED2}"/>
-              </a:ext>
-            </a:extLst>
-          </p:cNvPr>
-          <p:cNvSpPr/>
-          <p:nvPr/>
-        </p:nvSpPr>
-        <p:spPr>
-          <a:xfrm>
-            <a:off x="300022" y="1051361"/>
-            <a:ext cx="1305018" cy="422676"/>
-          </a:xfrm>
-          <a:prstGeom prst="rect">
-            <a:avLst/>
-          </a:prstGeom>
-          <a:solidFill>
-            <a:schemeClr val="accent1"/>
-          </a:solidFill>
-          <a:ln>
+            </a:prstGeom>
             <a:solidFill>
               <a:schemeClr val="accent1">
-                <a:lumMod val="75000"/>
+                <a:lumMod val="60000"/>
+                <a:lumOff val="40000"/>
               </a:schemeClr>
             </a:solidFill>
-          </a:ln>
-        </p:spPr>
-        <p:style>
-          <a:lnRef idx="2">
-            <a:schemeClr val="accent3">
-              <a:shade val="50000"/>
-            </a:schemeClr>
-          </a:lnRef>
-          <a:fillRef idx="1">
-            <a:schemeClr val="accent3"/>
-          </a:fillRef>
-          <a:effectRef idx="0">
-            <a:schemeClr val="accent3"/>
-          </a:effectRef>
-          <a:fontRef idx="minor">
-            <a:schemeClr val="lt1"/>
-          </a:fontRef>
-        </p:style>
-        <p:txBody>
-          <a:bodyPr rot="0" spcFirstLastPara="0" vertOverflow="overflow" horzOverflow="overflow" vert="horz" wrap="square" lIns="63305" tIns="31652" rIns="63305" bIns="31652" numCol="1" spcCol="0" rtlCol="0" fromWordArt="0" anchor="ctr" anchorCtr="0" forceAA="0" compatLnSpc="1">
-            <a:prstTxWarp prst="textNoShape">
+          </p:spPr>
+          <p:style>
+            <a:lnRef idx="2">
+              <a:schemeClr val="accent1">
+                <a:shade val="50000"/>
+              </a:schemeClr>
+            </a:lnRef>
+            <a:fillRef idx="1">
+              <a:schemeClr val="accent1"/>
+            </a:fillRef>
+            <a:effectRef idx="0">
+              <a:schemeClr val="accent1"/>
+            </a:effectRef>
+            <a:fontRef idx="minor">
+              <a:schemeClr val="lt1"/>
+            </a:fontRef>
+          </p:style>
+          <p:txBody>
+            <a:bodyPr rot="0" spcFirstLastPara="0" vertOverflow="overflow" horzOverflow="overflow" vert="horz" wrap="square" lIns="63305" tIns="31652" rIns="63305" bIns="31652" numCol="1" spcCol="0" rtlCol="0" fromWordArt="0" anchor="ctr" anchorCtr="0" forceAA="0" compatLnSpc="1">
+              <a:prstTxWarp prst="textNoShape">
+                <a:avLst/>
+              </a:prstTxWarp>
+              <a:noAutofit/>
+            </a:bodyPr>
+            <a:lstStyle/>
+            <a:p>
+              <a:pPr algn="ctr"/>
+              <a:r>
+                <a:rPr lang="pt-BR" sz="1246" dirty="0">
+                  <a:ln w="0"/>
+                  <a:solidFill>
+                    <a:schemeClr val="tx1"/>
+                  </a:solidFill>
+                  <a:effectLst>
+                    <a:outerShdw blurRad="38100" dist="19050" dir="2700000" algn="tl" rotWithShape="0">
+                      <a:schemeClr val="dk1">
+                        <a:alpha val="40000"/>
+                      </a:schemeClr>
+                    </a:outerShdw>
+                  </a:effectLst>
+                </a:rPr>
+                <a:t>Layout</a:t>
+              </a:r>
+              <a:endParaRPr lang="pt-BR" sz="1246" dirty="0"/>
+            </a:p>
+          </p:txBody>
+        </p:sp>
+        <p:sp>
+          <p:nvSpPr>
+            <p:cNvPr id="185" name="Rectangle 184">
+              <a:extLst>
+                <a:ext uri="{FF2B5EF4-FFF2-40B4-BE49-F238E27FC236}">
+                  <a16:creationId xmlns:a16="http://schemas.microsoft.com/office/drawing/2014/main" id="{D6F515B4-6A9F-443E-9279-0C1B210B3CAD}"/>
+                </a:ext>
+              </a:extLst>
+            </p:cNvPr>
+            <p:cNvSpPr/>
+            <p:nvPr/>
+          </p:nvSpPr>
+          <p:spPr>
+            <a:xfrm>
+              <a:off x="152927" y="3368860"/>
+              <a:ext cx="1613948" cy="806111"/>
+            </a:xfrm>
+            <a:prstGeom prst="rect">
               <a:avLst/>
-            </a:prstTxWarp>
-            <a:noAutofit/>
-          </a:bodyPr>
-          <a:lstStyle/>
-          <a:p>
-            <a:pPr algn="ctr"/>
-            <a:r>
-              <a:rPr lang="pt-BR" sz="1246" dirty="0">
-                <a:ln w="0"/>
+            </a:prstGeom>
+            <a:solidFill>
+              <a:schemeClr val="accent1">
+                <a:lumMod val="40000"/>
+                <a:lumOff val="60000"/>
+              </a:schemeClr>
+            </a:solidFill>
+          </p:spPr>
+          <p:style>
+            <a:lnRef idx="2">
+              <a:schemeClr val="accent1">
+                <a:shade val="50000"/>
+              </a:schemeClr>
+            </a:lnRef>
+            <a:fillRef idx="1">
+              <a:schemeClr val="accent1"/>
+            </a:fillRef>
+            <a:effectRef idx="0">
+              <a:schemeClr val="accent1"/>
+            </a:effectRef>
+            <a:fontRef idx="minor">
+              <a:schemeClr val="lt1"/>
+            </a:fontRef>
+          </p:style>
+          <p:txBody>
+            <a:bodyPr rot="0" spcFirstLastPara="0" vertOverflow="overflow" horzOverflow="overflow" vert="horz" wrap="square" lIns="63305" tIns="31652" rIns="63305" bIns="31652" numCol="1" spcCol="0" rtlCol="0" fromWordArt="0" anchor="b" anchorCtr="0" forceAA="0" compatLnSpc="1">
+              <a:prstTxWarp prst="textNoShape">
+                <a:avLst/>
+              </a:prstTxWarp>
+              <a:noAutofit/>
+            </a:bodyPr>
+            <a:lstStyle/>
+            <a:p>
+              <a:pPr algn="ctr"/>
+              <a:r>
+                <a:rPr lang="pt-BR" sz="1246" dirty="0" err="1">
+                  <a:ln w="0"/>
+                  <a:solidFill>
+                    <a:schemeClr val="tx1"/>
+                  </a:solidFill>
+                  <a:effectLst>
+                    <a:outerShdw blurRad="38100" dist="19050" dir="2700000" algn="tl" rotWithShape="0">
+                      <a:schemeClr val="dk1">
+                        <a:alpha val="40000"/>
+                      </a:schemeClr>
+                    </a:outerShdw>
+                  </a:effectLst>
+                </a:rPr>
+                <a:t>Hspice</a:t>
+              </a:r>
+              <a:r>
+                <a:rPr lang="pt-BR" sz="1246" dirty="0">
+                  <a:ln w="0"/>
+                  <a:solidFill>
+                    <a:schemeClr val="tx1"/>
+                  </a:solidFill>
+                  <a:effectLst>
+                    <a:outerShdw blurRad="38100" dist="19050" dir="2700000" algn="tl" rotWithShape="0">
+                      <a:schemeClr val="dk1">
+                        <a:alpha val="40000"/>
+                      </a:schemeClr>
+                    </a:outerShdw>
+                  </a:effectLst>
+                </a:rPr>
+                <a:t> </a:t>
+              </a:r>
+              <a:r>
+                <a:rPr lang="pt-BR" sz="1246" dirty="0" err="1">
+                  <a:ln w="0"/>
+                  <a:solidFill>
+                    <a:schemeClr val="tx1"/>
+                  </a:solidFill>
+                  <a:effectLst>
+                    <a:outerShdw blurRad="38100" dist="19050" dir="2700000" algn="tl" rotWithShape="0">
+                      <a:schemeClr val="dk1">
+                        <a:alpha val="40000"/>
+                      </a:schemeClr>
+                    </a:outerShdw>
+                  </a:effectLst>
+                </a:rPr>
+                <a:t>Synopsys</a:t>
+              </a:r>
+              <a:endParaRPr lang="pt-BR" sz="1246" dirty="0"/>
+            </a:p>
+          </p:txBody>
+        </p:sp>
+        <p:sp>
+          <p:nvSpPr>
+            <p:cNvPr id="186" name="Rectangle 185">
+              <a:extLst>
+                <a:ext uri="{FF2B5EF4-FFF2-40B4-BE49-F238E27FC236}">
+                  <a16:creationId xmlns:a16="http://schemas.microsoft.com/office/drawing/2014/main" id="{8EC55FF8-9DAD-4546-B7DB-DD2AD0D4D889}"/>
+                </a:ext>
+              </a:extLst>
+            </p:cNvPr>
+            <p:cNvSpPr/>
+            <p:nvPr/>
+          </p:nvSpPr>
+          <p:spPr>
+            <a:xfrm>
+              <a:off x="304582" y="3482040"/>
+              <a:ext cx="1310640" cy="443851"/>
+            </a:xfrm>
+            <a:prstGeom prst="rect">
+              <a:avLst/>
+            </a:prstGeom>
+          </p:spPr>
+          <p:style>
+            <a:lnRef idx="2">
+              <a:schemeClr val="accent1">
+                <a:shade val="50000"/>
+              </a:schemeClr>
+            </a:lnRef>
+            <a:fillRef idx="1">
+              <a:schemeClr val="accent1"/>
+            </a:fillRef>
+            <a:effectRef idx="0">
+              <a:schemeClr val="accent1"/>
+            </a:effectRef>
+            <a:fontRef idx="minor">
+              <a:schemeClr val="lt1"/>
+            </a:fontRef>
+          </p:style>
+          <p:txBody>
+            <a:bodyPr rot="0" spcFirstLastPara="0" vertOverflow="overflow" horzOverflow="overflow" vert="horz" wrap="square" lIns="63305" tIns="31652" rIns="63305" bIns="31652" numCol="1" spcCol="0" rtlCol="0" fromWordArt="0" anchor="t" anchorCtr="0" forceAA="0" compatLnSpc="1">
+              <a:prstTxWarp prst="textNoShape">
+                <a:avLst/>
+              </a:prstTxWarp>
+              <a:noAutofit/>
+            </a:bodyPr>
+            <a:lstStyle/>
+            <a:p>
+              <a:pPr algn="ctr"/>
+              <a:r>
+                <a:rPr lang="pt-BR" sz="1246" dirty="0" err="1"/>
+                <a:t>Process</a:t>
+              </a:r>
+              <a:r>
+                <a:rPr lang="pt-BR" sz="1246" dirty="0"/>
+                <a:t> </a:t>
+              </a:r>
+              <a:r>
+                <a:rPr lang="pt-BR" sz="1246" dirty="0" err="1"/>
+                <a:t>Variability</a:t>
+              </a:r>
+              <a:r>
+                <a:rPr lang="pt-BR" sz="1246" dirty="0"/>
+                <a:t> </a:t>
+              </a:r>
+              <a:r>
+                <a:rPr lang="pt-BR" sz="1246" dirty="0" err="1"/>
+                <a:t>Insertion</a:t>
+              </a:r>
+              <a:endParaRPr lang="pt-BR" sz="1246" dirty="0"/>
+            </a:p>
+          </p:txBody>
+        </p:sp>
+        <p:sp>
+          <p:nvSpPr>
+            <p:cNvPr id="187" name="Rectangle 186">
+              <a:extLst>
+                <a:ext uri="{FF2B5EF4-FFF2-40B4-BE49-F238E27FC236}">
+                  <a16:creationId xmlns:a16="http://schemas.microsoft.com/office/drawing/2014/main" id="{2D6C6517-F0C4-42C7-BDCD-E69619161ED2}"/>
+                </a:ext>
+              </a:extLst>
+            </p:cNvPr>
+            <p:cNvSpPr/>
+            <p:nvPr/>
+          </p:nvSpPr>
+          <p:spPr>
+            <a:xfrm>
+              <a:off x="300022" y="1051361"/>
+              <a:ext cx="1305018" cy="422676"/>
+            </a:xfrm>
+            <a:prstGeom prst="rect">
+              <a:avLst/>
+            </a:prstGeom>
+            <a:solidFill>
+              <a:schemeClr val="accent1"/>
+            </a:solidFill>
+            <a:ln>
+              <a:solidFill>
+                <a:schemeClr val="accent1">
+                  <a:lumMod val="75000"/>
+                </a:schemeClr>
+              </a:solidFill>
+            </a:ln>
+          </p:spPr>
+          <p:style>
+            <a:lnRef idx="2">
+              <a:schemeClr val="accent3">
+                <a:shade val="50000"/>
+              </a:schemeClr>
+            </a:lnRef>
+            <a:fillRef idx="1">
+              <a:schemeClr val="accent3"/>
+            </a:fillRef>
+            <a:effectRef idx="0">
+              <a:schemeClr val="accent3"/>
+            </a:effectRef>
+            <a:fontRef idx="minor">
+              <a:schemeClr val="lt1"/>
+            </a:fontRef>
+          </p:style>
+          <p:txBody>
+            <a:bodyPr rot="0" spcFirstLastPara="0" vertOverflow="overflow" horzOverflow="overflow" vert="horz" wrap="square" lIns="63305" tIns="31652" rIns="63305" bIns="31652" numCol="1" spcCol="0" rtlCol="0" fromWordArt="0" anchor="ctr" anchorCtr="0" forceAA="0" compatLnSpc="1">
+              <a:prstTxWarp prst="textNoShape">
+                <a:avLst/>
+              </a:prstTxWarp>
+              <a:noAutofit/>
+            </a:bodyPr>
+            <a:lstStyle/>
+            <a:p>
+              <a:pPr algn="ctr"/>
+              <a:r>
+                <a:rPr lang="pt-BR" sz="1246" dirty="0">
+                  <a:ln w="0"/>
+                  <a:solidFill>
+                    <a:schemeClr val="bg1"/>
+                  </a:solidFill>
+                  <a:effectLst>
+                    <a:outerShdw blurRad="38100" dist="19050" dir="2700000" algn="tl" rotWithShape="0">
+                      <a:schemeClr val="dk1">
+                        <a:alpha val="40000"/>
+                      </a:schemeClr>
+                    </a:outerShdw>
+                  </a:effectLst>
+                </a:rPr>
+                <a:t>Layout Technology File</a:t>
+              </a:r>
+              <a:endParaRPr lang="pt-BR" sz="1246" dirty="0">
                 <a:solidFill>
                   <a:schemeClr val="bg1"/>
                 </a:solidFill>
-                <a:effectLst>
-                  <a:outerShdw blurRad="38100" dist="19050" dir="2700000" algn="tl" rotWithShape="0">
-                    <a:schemeClr val="dk1">
-                      <a:alpha val="40000"/>
-                    </a:schemeClr>
-                  </a:outerShdw>
-                </a:effectLst>
-              </a:rPr>
-              <a:t>Layout Technology File</a:t>
-            </a:r>
-            <a:endParaRPr lang="pt-BR" sz="1246" dirty="0">
+              </a:endParaRPr>
+            </a:p>
+          </p:txBody>
+        </p:sp>
+        <p:sp>
+          <p:nvSpPr>
+            <p:cNvPr id="188" name="Rectangle 187">
+              <a:extLst>
+                <a:ext uri="{FF2B5EF4-FFF2-40B4-BE49-F238E27FC236}">
+                  <a16:creationId xmlns:a16="http://schemas.microsoft.com/office/drawing/2014/main" id="{37346578-F82C-493E-89B4-61F6AA0878E2}"/>
+                </a:ext>
+              </a:extLst>
+            </p:cNvPr>
+            <p:cNvSpPr/>
+            <p:nvPr/>
+          </p:nvSpPr>
+          <p:spPr>
+            <a:xfrm>
+              <a:off x="2573849" y="1474037"/>
+              <a:ext cx="1613948" cy="2700934"/>
+            </a:xfrm>
+            <a:prstGeom prst="rect">
+              <a:avLst/>
+            </a:prstGeom>
+            <a:solidFill>
+              <a:schemeClr val="accent1">
+                <a:lumMod val="40000"/>
+                <a:lumOff val="60000"/>
+              </a:schemeClr>
+            </a:solidFill>
+          </p:spPr>
+          <p:style>
+            <a:lnRef idx="2">
+              <a:schemeClr val="accent1">
+                <a:shade val="50000"/>
+              </a:schemeClr>
+            </a:lnRef>
+            <a:fillRef idx="1">
+              <a:schemeClr val="accent1"/>
+            </a:fillRef>
+            <a:effectRef idx="0">
+              <a:schemeClr val="accent1"/>
+            </a:effectRef>
+            <a:fontRef idx="minor">
+              <a:schemeClr val="lt1"/>
+            </a:fontRef>
+          </p:style>
+          <p:txBody>
+            <a:bodyPr rot="0" spcFirstLastPara="0" vertOverflow="overflow" horzOverflow="overflow" vert="horz" wrap="square" lIns="63305" tIns="31652" rIns="63305" bIns="31652" numCol="1" spcCol="0" rtlCol="0" fromWordArt="0" anchor="b" anchorCtr="0" forceAA="0" compatLnSpc="1">
+              <a:prstTxWarp prst="textNoShape">
+                <a:avLst/>
+              </a:prstTxWarp>
+              <a:noAutofit/>
+            </a:bodyPr>
+            <a:lstStyle/>
+            <a:p>
+              <a:pPr algn="ctr"/>
+              <a:r>
+                <a:rPr lang="pt-BR" sz="1246" dirty="0">
+                  <a:ln w="0"/>
+                  <a:solidFill>
+                    <a:schemeClr val="tx1"/>
+                  </a:solidFill>
+                  <a:effectLst>
+                    <a:outerShdw blurRad="38100" dist="19050" dir="2700000" algn="tl" rotWithShape="0">
+                      <a:schemeClr val="dk1">
+                        <a:alpha val="40000"/>
+                      </a:schemeClr>
+                    </a:outerShdw>
+                  </a:effectLst>
+                </a:rPr>
+                <a:t>Calibre </a:t>
+              </a:r>
+              <a:r>
+                <a:rPr lang="pt-BR" sz="1246" dirty="0" err="1">
+                  <a:ln w="0"/>
+                  <a:solidFill>
+                    <a:schemeClr val="tx1"/>
+                  </a:solidFill>
+                  <a:effectLst>
+                    <a:outerShdw blurRad="38100" dist="19050" dir="2700000" algn="tl" rotWithShape="0">
+                      <a:schemeClr val="dk1">
+                        <a:alpha val="40000"/>
+                      </a:schemeClr>
+                    </a:outerShdw>
+                  </a:effectLst>
+                </a:rPr>
+                <a:t>Menthor</a:t>
+              </a:r>
+              <a:endParaRPr lang="pt-BR" sz="1246" dirty="0"/>
+            </a:p>
+          </p:txBody>
+        </p:sp>
+        <p:sp>
+          <p:nvSpPr>
+            <p:cNvPr id="189" name="Rectangle 188">
+              <a:extLst>
+                <a:ext uri="{FF2B5EF4-FFF2-40B4-BE49-F238E27FC236}">
+                  <a16:creationId xmlns:a16="http://schemas.microsoft.com/office/drawing/2014/main" id="{8C6064D0-17DA-466D-A828-2BD7A1633038}"/>
+                </a:ext>
+              </a:extLst>
+            </p:cNvPr>
+            <p:cNvSpPr/>
+            <p:nvPr/>
+          </p:nvSpPr>
+          <p:spPr>
+            <a:xfrm>
+              <a:off x="2754538" y="1705284"/>
+              <a:ext cx="1299359" cy="1285463"/>
+            </a:xfrm>
+            <a:prstGeom prst="rect">
+              <a:avLst/>
+            </a:prstGeom>
+          </p:spPr>
+          <p:style>
+            <a:lnRef idx="2">
+              <a:schemeClr val="accent1">
+                <a:shade val="50000"/>
+              </a:schemeClr>
+            </a:lnRef>
+            <a:fillRef idx="1">
+              <a:schemeClr val="accent1"/>
+            </a:fillRef>
+            <a:effectRef idx="0">
+              <a:schemeClr val="accent1"/>
+            </a:effectRef>
+            <a:fontRef idx="minor">
+              <a:schemeClr val="lt1"/>
+            </a:fontRef>
+          </p:style>
+          <p:txBody>
+            <a:bodyPr rot="0" spcFirstLastPara="0" vertOverflow="overflow" horzOverflow="overflow" vert="horz" wrap="square" lIns="63305" tIns="31652" rIns="63305" bIns="31652" numCol="1" spcCol="0" rtlCol="0" fromWordArt="0" anchor="t" anchorCtr="0" forceAA="0" compatLnSpc="1">
+              <a:prstTxWarp prst="textNoShape">
+                <a:avLst/>
+              </a:prstTxWarp>
+              <a:noAutofit/>
+            </a:bodyPr>
+            <a:lstStyle/>
+            <a:p>
+              <a:pPr algn="ctr"/>
+              <a:r>
+                <a:rPr lang="pt-BR" sz="1246" dirty="0" err="1"/>
+                <a:t>Validation</a:t>
+              </a:r>
+              <a:endParaRPr lang="pt-BR" sz="1246" dirty="0"/>
+            </a:p>
+          </p:txBody>
+        </p:sp>
+        <p:sp>
+          <p:nvSpPr>
+            <p:cNvPr id="190" name="Rectangle 189">
+              <a:extLst>
+                <a:ext uri="{FF2B5EF4-FFF2-40B4-BE49-F238E27FC236}">
+                  <a16:creationId xmlns:a16="http://schemas.microsoft.com/office/drawing/2014/main" id="{FCC477BD-3FEA-47DF-B75F-824F94B56560}"/>
+                </a:ext>
+              </a:extLst>
+            </p:cNvPr>
+            <p:cNvSpPr/>
+            <p:nvPr/>
+          </p:nvSpPr>
+          <p:spPr>
+            <a:xfrm>
+              <a:off x="2977217" y="2035606"/>
+              <a:ext cx="918990" cy="244331"/>
+            </a:xfrm>
+            <a:prstGeom prst="rect">
+              <a:avLst/>
+            </a:prstGeom>
+            <a:solidFill>
+              <a:schemeClr val="accent1">
+                <a:lumMod val="60000"/>
+                <a:lumOff val="40000"/>
+              </a:schemeClr>
+            </a:solidFill>
+          </p:spPr>
+          <p:style>
+            <a:lnRef idx="2">
+              <a:schemeClr val="accent1">
+                <a:shade val="50000"/>
+              </a:schemeClr>
+            </a:lnRef>
+            <a:fillRef idx="1">
+              <a:schemeClr val="accent1"/>
+            </a:fillRef>
+            <a:effectRef idx="0">
+              <a:schemeClr val="accent1"/>
+            </a:effectRef>
+            <a:fontRef idx="minor">
+              <a:schemeClr val="lt1"/>
+            </a:fontRef>
+          </p:style>
+          <p:txBody>
+            <a:bodyPr rot="0" spcFirstLastPara="0" vertOverflow="overflow" horzOverflow="overflow" vert="horz" wrap="square" lIns="63305" tIns="31652" rIns="63305" bIns="31652" numCol="1" spcCol="0" rtlCol="0" fromWordArt="0" anchor="ctr" anchorCtr="0" forceAA="0" compatLnSpc="1">
+              <a:prstTxWarp prst="textNoShape">
+                <a:avLst/>
+              </a:prstTxWarp>
+              <a:noAutofit/>
+            </a:bodyPr>
+            <a:lstStyle/>
+            <a:p>
+              <a:pPr algn="ctr"/>
+              <a:r>
+                <a:rPr lang="pt-BR" sz="1246" dirty="0">
+                  <a:ln w="0"/>
+                  <a:solidFill>
+                    <a:schemeClr val="tx1"/>
+                  </a:solidFill>
+                  <a:effectLst>
+                    <a:outerShdw blurRad="38100" dist="19050" dir="2700000" algn="tl" rotWithShape="0">
+                      <a:schemeClr val="dk1">
+                        <a:alpha val="40000"/>
+                      </a:schemeClr>
+                    </a:outerShdw>
+                  </a:effectLst>
+                </a:rPr>
+                <a:t>DRC</a:t>
+              </a:r>
+            </a:p>
+          </p:txBody>
+        </p:sp>
+        <p:sp>
+          <p:nvSpPr>
+            <p:cNvPr id="191" name="Rectangle 190">
+              <a:extLst>
+                <a:ext uri="{FF2B5EF4-FFF2-40B4-BE49-F238E27FC236}">
+                  <a16:creationId xmlns:a16="http://schemas.microsoft.com/office/drawing/2014/main" id="{16FE777D-99E9-49CB-AA26-56CF9E253C2F}"/>
+                </a:ext>
+              </a:extLst>
+            </p:cNvPr>
+            <p:cNvSpPr/>
+            <p:nvPr/>
+          </p:nvSpPr>
+          <p:spPr>
+            <a:xfrm>
+              <a:off x="2969506" y="2323473"/>
+              <a:ext cx="911279" cy="242345"/>
+            </a:xfrm>
+            <a:prstGeom prst="rect">
+              <a:avLst/>
+            </a:prstGeom>
+            <a:solidFill>
+              <a:schemeClr val="accent1">
+                <a:lumMod val="60000"/>
+                <a:lumOff val="40000"/>
+              </a:schemeClr>
+            </a:solidFill>
+          </p:spPr>
+          <p:style>
+            <a:lnRef idx="2">
+              <a:schemeClr val="accent1">
+                <a:shade val="50000"/>
+              </a:schemeClr>
+            </a:lnRef>
+            <a:fillRef idx="1">
+              <a:schemeClr val="accent1"/>
+            </a:fillRef>
+            <a:effectRef idx="0">
+              <a:schemeClr val="accent1"/>
+            </a:effectRef>
+            <a:fontRef idx="minor">
+              <a:schemeClr val="lt1"/>
+            </a:fontRef>
+          </p:style>
+          <p:txBody>
+            <a:bodyPr rot="0" spcFirstLastPara="0" vertOverflow="overflow" horzOverflow="overflow" vert="horz" wrap="square" lIns="63305" tIns="31652" rIns="63305" bIns="31652" numCol="1" spcCol="0" rtlCol="0" fromWordArt="0" anchor="ctr" anchorCtr="0" forceAA="0" compatLnSpc="1">
+              <a:prstTxWarp prst="textNoShape">
+                <a:avLst/>
+              </a:prstTxWarp>
+              <a:noAutofit/>
+            </a:bodyPr>
+            <a:lstStyle/>
+            <a:p>
+              <a:pPr algn="ctr"/>
+              <a:r>
+                <a:rPr lang="pt-BR" sz="1246" dirty="0">
+                  <a:ln w="0"/>
+                  <a:solidFill>
+                    <a:schemeClr val="tx1"/>
+                  </a:solidFill>
+                  <a:effectLst>
+                    <a:outerShdw blurRad="38100" dist="19050" dir="2700000" algn="tl" rotWithShape="0">
+                      <a:schemeClr val="dk1">
+                        <a:alpha val="40000"/>
+                      </a:schemeClr>
+                    </a:outerShdw>
+                  </a:effectLst>
+                </a:rPr>
+                <a:t>LVS</a:t>
+              </a:r>
+            </a:p>
+          </p:txBody>
+        </p:sp>
+        <p:sp>
+          <p:nvSpPr>
+            <p:cNvPr id="192" name="Rectangle 191">
+              <a:extLst>
+                <a:ext uri="{FF2B5EF4-FFF2-40B4-BE49-F238E27FC236}">
+                  <a16:creationId xmlns:a16="http://schemas.microsoft.com/office/drawing/2014/main" id="{9DC06CC8-EB97-4979-9DAC-A818ABB5AC95}"/>
+                </a:ext>
+              </a:extLst>
+            </p:cNvPr>
+            <p:cNvSpPr/>
+            <p:nvPr/>
+          </p:nvSpPr>
+          <p:spPr>
+            <a:xfrm>
+              <a:off x="2977217" y="2610259"/>
+              <a:ext cx="911279" cy="242345"/>
+            </a:xfrm>
+            <a:prstGeom prst="rect">
+              <a:avLst/>
+            </a:prstGeom>
+            <a:solidFill>
+              <a:schemeClr val="accent1">
+                <a:lumMod val="60000"/>
+                <a:lumOff val="40000"/>
+              </a:schemeClr>
+            </a:solidFill>
+          </p:spPr>
+          <p:style>
+            <a:lnRef idx="2">
+              <a:schemeClr val="accent1">
+                <a:shade val="50000"/>
+              </a:schemeClr>
+            </a:lnRef>
+            <a:fillRef idx="1">
+              <a:schemeClr val="accent1"/>
+            </a:fillRef>
+            <a:effectRef idx="0">
+              <a:schemeClr val="accent1"/>
+            </a:effectRef>
+            <a:fontRef idx="minor">
+              <a:schemeClr val="lt1"/>
+            </a:fontRef>
+          </p:style>
+          <p:txBody>
+            <a:bodyPr rot="0" spcFirstLastPara="0" vertOverflow="overflow" horzOverflow="overflow" vert="horz" wrap="square" lIns="63305" tIns="31652" rIns="63305" bIns="31652" numCol="1" spcCol="0" rtlCol="0" fromWordArt="0" anchor="ctr" anchorCtr="0" forceAA="0" compatLnSpc="1">
+              <a:prstTxWarp prst="textNoShape">
+                <a:avLst/>
+              </a:prstTxWarp>
+              <a:noAutofit/>
+            </a:bodyPr>
+            <a:lstStyle/>
+            <a:p>
+              <a:pPr algn="ctr"/>
+              <a:r>
+                <a:rPr lang="pt-BR" sz="1246" dirty="0" err="1">
+                  <a:ln w="0"/>
+                  <a:solidFill>
+                    <a:schemeClr val="tx1"/>
+                  </a:solidFill>
+                  <a:effectLst>
+                    <a:outerShdw blurRad="38100" dist="19050" dir="2700000" algn="tl" rotWithShape="0">
+                      <a:schemeClr val="dk1">
+                        <a:alpha val="40000"/>
+                      </a:schemeClr>
+                    </a:outerShdw>
+                  </a:effectLst>
+                </a:rPr>
+                <a:t>Behaviour</a:t>
+              </a:r>
+              <a:endParaRPr lang="pt-BR" sz="1246" dirty="0"/>
+            </a:p>
+          </p:txBody>
+        </p:sp>
+        <p:sp>
+          <p:nvSpPr>
+            <p:cNvPr id="193" name="Rectangle 192">
+              <a:extLst>
+                <a:ext uri="{FF2B5EF4-FFF2-40B4-BE49-F238E27FC236}">
+                  <a16:creationId xmlns:a16="http://schemas.microsoft.com/office/drawing/2014/main" id="{14035736-074B-4DC0-8C3B-0112D1626E4A}"/>
+                </a:ext>
+              </a:extLst>
+            </p:cNvPr>
+            <p:cNvSpPr/>
+            <p:nvPr/>
+          </p:nvSpPr>
+          <p:spPr>
+            <a:xfrm>
+              <a:off x="2754538" y="3491226"/>
+              <a:ext cx="1310640" cy="443851"/>
+            </a:xfrm>
+            <a:prstGeom prst="rect">
+              <a:avLst/>
+            </a:prstGeom>
+          </p:spPr>
+          <p:style>
+            <a:lnRef idx="2">
+              <a:schemeClr val="accent1">
+                <a:shade val="50000"/>
+              </a:schemeClr>
+            </a:lnRef>
+            <a:fillRef idx="1">
+              <a:schemeClr val="accent1"/>
+            </a:fillRef>
+            <a:effectRef idx="0">
+              <a:schemeClr val="accent1"/>
+            </a:effectRef>
+            <a:fontRef idx="minor">
+              <a:schemeClr val="lt1"/>
+            </a:fontRef>
+          </p:style>
+          <p:txBody>
+            <a:bodyPr rot="0" spcFirstLastPara="0" vertOverflow="overflow" horzOverflow="overflow" vert="horz" wrap="square" lIns="63305" tIns="31652" rIns="63305" bIns="31652" numCol="1" spcCol="0" rtlCol="0" fromWordArt="0" anchor="t" anchorCtr="0" forceAA="0" compatLnSpc="1">
+              <a:prstTxWarp prst="textNoShape">
+                <a:avLst/>
+              </a:prstTxWarp>
+              <a:noAutofit/>
+            </a:bodyPr>
+            <a:lstStyle/>
+            <a:p>
+              <a:pPr algn="ctr"/>
+              <a:r>
+                <a:rPr lang="pt-BR" sz="1246" dirty="0" err="1"/>
+                <a:t>Parasitic</a:t>
+              </a:r>
+              <a:r>
+                <a:rPr lang="pt-BR" sz="1246" dirty="0"/>
+                <a:t> </a:t>
+              </a:r>
+              <a:r>
+                <a:rPr lang="pt-BR" sz="1246" dirty="0" err="1"/>
+                <a:t>Extraction</a:t>
+              </a:r>
+              <a:endParaRPr lang="pt-BR" sz="1246" dirty="0"/>
+            </a:p>
+          </p:txBody>
+        </p:sp>
+        <p:cxnSp>
+          <p:nvCxnSpPr>
+            <p:cNvPr id="194" name="Straight Arrow Connector 193">
+              <a:extLst>
+                <a:ext uri="{FF2B5EF4-FFF2-40B4-BE49-F238E27FC236}">
+                  <a16:creationId xmlns:a16="http://schemas.microsoft.com/office/drawing/2014/main" id="{E19A3BD9-E431-44DF-9F1E-8BDD825F0F5F}"/>
+                </a:ext>
+              </a:extLst>
+            </p:cNvPr>
+            <p:cNvCxnSpPr>
+              <a:cxnSpLocks/>
+            </p:cNvCxnSpPr>
+            <p:nvPr/>
+          </p:nvCxnSpPr>
+          <p:spPr>
+            <a:xfrm flipH="1">
+              <a:off x="3399113" y="3019045"/>
+              <a:ext cx="1" cy="437778"/>
+            </a:xfrm>
+            <a:prstGeom prst="straightConnector1">
+              <a:avLst/>
+            </a:prstGeom>
+            <a:ln w="38100">
               <a:solidFill>
-                <a:schemeClr val="bg1"/>
+                <a:srgbClr val="FF0000"/>
               </a:solidFill>
-            </a:endParaRPr>
-          </a:p>
-        </p:txBody>
-      </p:sp>
-      <p:sp>
-        <p:nvSpPr>
-          <p:cNvPr id="188" name="Rectangle 187">
-            <a:extLst>
-              <a:ext uri="{FF2B5EF4-FFF2-40B4-BE49-F238E27FC236}">
-                <a16:creationId xmlns:a16="http://schemas.microsoft.com/office/drawing/2014/main" id="{37346578-F82C-493E-89B4-61F6AA0878E2}"/>
-              </a:ext>
-            </a:extLst>
-          </p:cNvPr>
-          <p:cNvSpPr/>
-          <p:nvPr/>
-        </p:nvSpPr>
-        <p:spPr>
-          <a:xfrm>
-            <a:off x="2573849" y="1474037"/>
-            <a:ext cx="1613948" cy="2700934"/>
-          </a:xfrm>
-          <a:prstGeom prst="rect">
-            <a:avLst/>
-          </a:prstGeom>
-          <a:solidFill>
-            <a:schemeClr val="accent1">
-              <a:lumMod val="40000"/>
-              <a:lumOff val="60000"/>
-            </a:schemeClr>
-          </a:solidFill>
-        </p:spPr>
-        <p:style>
-          <a:lnRef idx="2">
-            <a:schemeClr val="accent1">
-              <a:shade val="50000"/>
-            </a:schemeClr>
-          </a:lnRef>
-          <a:fillRef idx="1">
-            <a:schemeClr val="accent1"/>
-          </a:fillRef>
-          <a:effectRef idx="0">
-            <a:schemeClr val="accent1"/>
-          </a:effectRef>
-          <a:fontRef idx="minor">
-            <a:schemeClr val="lt1"/>
-          </a:fontRef>
-        </p:style>
-        <p:txBody>
-          <a:bodyPr rot="0" spcFirstLastPara="0" vertOverflow="overflow" horzOverflow="overflow" vert="horz" wrap="square" lIns="63305" tIns="31652" rIns="63305" bIns="31652" numCol="1" spcCol="0" rtlCol="0" fromWordArt="0" anchor="b" anchorCtr="0" forceAA="0" compatLnSpc="1">
-            <a:prstTxWarp prst="textNoShape">
+              <a:prstDash val="sysDot"/>
+              <a:tailEnd type="triangle"/>
+            </a:ln>
+          </p:spPr>
+          <p:style>
+            <a:lnRef idx="1">
+              <a:schemeClr val="accent1"/>
+            </a:lnRef>
+            <a:fillRef idx="0">
+              <a:schemeClr val="accent1"/>
+            </a:fillRef>
+            <a:effectRef idx="0">
+              <a:schemeClr val="accent1"/>
+            </a:effectRef>
+            <a:fontRef idx="minor">
+              <a:schemeClr val="tx1"/>
+            </a:fontRef>
+          </p:style>
+        </p:cxnSp>
+        <p:cxnSp>
+          <p:nvCxnSpPr>
+            <p:cNvPr id="195" name="Straight Arrow Connector 194">
+              <a:extLst>
+                <a:ext uri="{FF2B5EF4-FFF2-40B4-BE49-F238E27FC236}">
+                  <a16:creationId xmlns:a16="http://schemas.microsoft.com/office/drawing/2014/main" id="{66747757-CB8E-4EAC-A1DA-B690B43D61E2}"/>
+                </a:ext>
+              </a:extLst>
+            </p:cNvPr>
+            <p:cNvCxnSpPr>
+              <a:cxnSpLocks/>
+              <a:endCxn id="186" idx="3"/>
+            </p:cNvCxnSpPr>
+            <p:nvPr/>
+          </p:nvCxnSpPr>
+          <p:spPr>
+            <a:xfrm flipH="1">
+              <a:off x="1615220" y="3703965"/>
+              <a:ext cx="1124361" cy="0"/>
+            </a:xfrm>
+            <a:prstGeom prst="straightConnector1">
               <a:avLst/>
-            </a:prstTxWarp>
-            <a:noAutofit/>
-          </a:bodyPr>
-          <a:lstStyle/>
-          <a:p>
-            <a:pPr algn="ctr"/>
-            <a:r>
-              <a:rPr lang="pt-BR" sz="1246" dirty="0">
-                <a:ln w="0"/>
-                <a:solidFill>
-                  <a:schemeClr val="tx1"/>
-                </a:solidFill>
-                <a:effectLst>
-                  <a:outerShdw blurRad="38100" dist="19050" dir="2700000" algn="tl" rotWithShape="0">
-                    <a:schemeClr val="dk1">
-                      <a:alpha val="40000"/>
-                    </a:schemeClr>
-                  </a:outerShdw>
-                </a:effectLst>
-              </a:rPr>
-              <a:t>Calibre </a:t>
-            </a:r>
-            <a:r>
-              <a:rPr lang="pt-BR" sz="1246" dirty="0" err="1">
-                <a:ln w="0"/>
-                <a:solidFill>
-                  <a:schemeClr val="tx1"/>
-                </a:solidFill>
-                <a:effectLst>
-                  <a:outerShdw blurRad="38100" dist="19050" dir="2700000" algn="tl" rotWithShape="0">
-                    <a:schemeClr val="dk1">
-                      <a:alpha val="40000"/>
-                    </a:schemeClr>
-                  </a:outerShdw>
-                </a:effectLst>
-              </a:rPr>
-              <a:t>Menthor</a:t>
-            </a:r>
-            <a:endParaRPr lang="pt-BR" sz="1246" dirty="0"/>
-          </a:p>
-        </p:txBody>
-      </p:sp>
-      <p:sp>
-        <p:nvSpPr>
-          <p:cNvPr id="189" name="Rectangle 188">
-            <a:extLst>
-              <a:ext uri="{FF2B5EF4-FFF2-40B4-BE49-F238E27FC236}">
-                <a16:creationId xmlns:a16="http://schemas.microsoft.com/office/drawing/2014/main" id="{8C6064D0-17DA-466D-A828-2BD7A1633038}"/>
-              </a:ext>
-            </a:extLst>
-          </p:cNvPr>
-          <p:cNvSpPr/>
-          <p:nvPr/>
-        </p:nvSpPr>
-        <p:spPr>
-          <a:xfrm>
-            <a:off x="2754538" y="1705284"/>
-            <a:ext cx="1299359" cy="1285463"/>
-          </a:xfrm>
-          <a:prstGeom prst="rect">
-            <a:avLst/>
-          </a:prstGeom>
-        </p:spPr>
-        <p:style>
-          <a:lnRef idx="2">
-            <a:schemeClr val="accent1">
-              <a:shade val="50000"/>
-            </a:schemeClr>
-          </a:lnRef>
-          <a:fillRef idx="1">
-            <a:schemeClr val="accent1"/>
-          </a:fillRef>
-          <a:effectRef idx="0">
-            <a:schemeClr val="accent1"/>
-          </a:effectRef>
-          <a:fontRef idx="minor">
-            <a:schemeClr val="lt1"/>
-          </a:fontRef>
-        </p:style>
-        <p:txBody>
-          <a:bodyPr rot="0" spcFirstLastPara="0" vertOverflow="overflow" horzOverflow="overflow" vert="horz" wrap="square" lIns="63305" tIns="31652" rIns="63305" bIns="31652" numCol="1" spcCol="0" rtlCol="0" fromWordArt="0" anchor="t" anchorCtr="0" forceAA="0" compatLnSpc="1">
-            <a:prstTxWarp prst="textNoShape">
+            </a:prstGeom>
+            <a:ln w="38100">
+              <a:solidFill>
+                <a:srgbClr val="FF0000"/>
+              </a:solidFill>
+              <a:prstDash val="sysDot"/>
+              <a:tailEnd type="triangle"/>
+            </a:ln>
+          </p:spPr>
+          <p:style>
+            <a:lnRef idx="1">
+              <a:schemeClr val="accent1"/>
+            </a:lnRef>
+            <a:fillRef idx="0">
+              <a:schemeClr val="accent1"/>
+            </a:fillRef>
+            <a:effectRef idx="0">
+              <a:schemeClr val="accent1"/>
+            </a:effectRef>
+            <a:fontRef idx="minor">
+              <a:schemeClr val="tx1"/>
+            </a:fontRef>
+          </p:style>
+        </p:cxnSp>
+        <p:cxnSp>
+          <p:nvCxnSpPr>
+            <p:cNvPr id="196" name="Straight Arrow Connector 195">
+              <a:extLst>
+                <a:ext uri="{FF2B5EF4-FFF2-40B4-BE49-F238E27FC236}">
+                  <a16:creationId xmlns:a16="http://schemas.microsoft.com/office/drawing/2014/main" id="{00AEE103-FD75-4406-BA4F-4B723A9C9280}"/>
+                </a:ext>
+              </a:extLst>
+            </p:cNvPr>
+            <p:cNvCxnSpPr>
+              <a:cxnSpLocks/>
+            </p:cNvCxnSpPr>
+            <p:nvPr/>
+          </p:nvCxnSpPr>
+          <p:spPr>
+            <a:xfrm>
+              <a:off x="1630177" y="2397670"/>
+              <a:ext cx="1124361" cy="0"/>
+            </a:xfrm>
+            <a:prstGeom prst="straightConnector1">
               <a:avLst/>
-            </a:prstTxWarp>
-            <a:noAutofit/>
-          </a:bodyPr>
-          <a:lstStyle/>
-          <a:p>
-            <a:pPr algn="ctr"/>
-            <a:r>
-              <a:rPr lang="pt-BR" sz="1246" dirty="0" err="1"/>
-              <a:t>Validation</a:t>
-            </a:r>
-            <a:endParaRPr lang="pt-BR" sz="1246" dirty="0"/>
-          </a:p>
-        </p:txBody>
-      </p:sp>
-      <p:sp>
-        <p:nvSpPr>
-          <p:cNvPr id="190" name="Rectangle 189">
-            <a:extLst>
-              <a:ext uri="{FF2B5EF4-FFF2-40B4-BE49-F238E27FC236}">
-                <a16:creationId xmlns:a16="http://schemas.microsoft.com/office/drawing/2014/main" id="{FCC477BD-3FEA-47DF-B75F-824F94B56560}"/>
-              </a:ext>
-            </a:extLst>
-          </p:cNvPr>
-          <p:cNvSpPr/>
-          <p:nvPr/>
-        </p:nvSpPr>
-        <p:spPr>
-          <a:xfrm>
-            <a:off x="2977217" y="2035606"/>
-            <a:ext cx="918990" cy="244331"/>
-          </a:xfrm>
-          <a:prstGeom prst="rect">
-            <a:avLst/>
-          </a:prstGeom>
-          <a:solidFill>
-            <a:schemeClr val="accent1">
-              <a:lumMod val="60000"/>
-              <a:lumOff val="40000"/>
-            </a:schemeClr>
-          </a:solidFill>
-        </p:spPr>
-        <p:style>
-          <a:lnRef idx="2">
-            <a:schemeClr val="accent1">
-              <a:shade val="50000"/>
-            </a:schemeClr>
-          </a:lnRef>
-          <a:fillRef idx="1">
-            <a:schemeClr val="accent1"/>
-          </a:fillRef>
-          <a:effectRef idx="0">
-            <a:schemeClr val="accent1"/>
-          </a:effectRef>
-          <a:fontRef idx="minor">
-            <a:schemeClr val="lt1"/>
-          </a:fontRef>
-        </p:style>
-        <p:txBody>
-          <a:bodyPr rot="0" spcFirstLastPara="0" vertOverflow="overflow" horzOverflow="overflow" vert="horz" wrap="square" lIns="63305" tIns="31652" rIns="63305" bIns="31652" numCol="1" spcCol="0" rtlCol="0" fromWordArt="0" anchor="ctr" anchorCtr="0" forceAA="0" compatLnSpc="1">
-            <a:prstTxWarp prst="textNoShape">
+            </a:prstGeom>
+            <a:ln w="38100">
+              <a:solidFill>
+                <a:srgbClr val="FF0000"/>
+              </a:solidFill>
+              <a:prstDash val="sysDot"/>
+              <a:tailEnd type="triangle"/>
+            </a:ln>
+          </p:spPr>
+          <p:style>
+            <a:lnRef idx="1">
+              <a:schemeClr val="accent1"/>
+            </a:lnRef>
+            <a:fillRef idx="0">
+              <a:schemeClr val="accent1"/>
+            </a:fillRef>
+            <a:effectRef idx="0">
+              <a:schemeClr val="accent1"/>
+            </a:effectRef>
+            <a:fontRef idx="minor">
+              <a:schemeClr val="tx1"/>
+            </a:fontRef>
+          </p:style>
+        </p:cxnSp>
+        <p:sp>
+          <p:nvSpPr>
+            <p:cNvPr id="197" name="TextBox 196">
+              <a:extLst>
+                <a:ext uri="{FF2B5EF4-FFF2-40B4-BE49-F238E27FC236}">
+                  <a16:creationId xmlns:a16="http://schemas.microsoft.com/office/drawing/2014/main" id="{A2EE3788-69D0-4C9C-94BD-23EC93857124}"/>
+                </a:ext>
+              </a:extLst>
+            </p:cNvPr>
+            <p:cNvSpPr txBox="1"/>
+            <p:nvPr/>
+          </p:nvSpPr>
+          <p:spPr>
+            <a:xfrm>
+              <a:off x="1771968" y="2080061"/>
+              <a:ext cx="810863" cy="369460"/>
+            </a:xfrm>
+            <a:prstGeom prst="rect">
               <a:avLst/>
-            </a:prstTxWarp>
-            <a:noAutofit/>
-          </a:bodyPr>
-          <a:lstStyle/>
-          <a:p>
-            <a:pPr algn="ctr"/>
-            <a:r>
-              <a:rPr lang="pt-BR" sz="1246" dirty="0">
-                <a:ln w="0"/>
-                <a:solidFill>
-                  <a:schemeClr val="tx1"/>
-                </a:solidFill>
-                <a:effectLst>
-                  <a:outerShdw blurRad="38100" dist="19050" dir="2700000" algn="tl" rotWithShape="0">
-                    <a:schemeClr val="dk1">
-                      <a:alpha val="40000"/>
-                    </a:schemeClr>
-                  </a:outerShdw>
-                </a:effectLst>
-              </a:rPr>
-              <a:t>DRC</a:t>
-            </a:r>
-          </a:p>
-        </p:txBody>
-      </p:sp>
-      <p:sp>
-        <p:nvSpPr>
-          <p:cNvPr id="191" name="Rectangle 190">
-            <a:extLst>
-              <a:ext uri="{FF2B5EF4-FFF2-40B4-BE49-F238E27FC236}">
-                <a16:creationId xmlns:a16="http://schemas.microsoft.com/office/drawing/2014/main" id="{16FE777D-99E9-49CB-AA26-56CF9E253C2F}"/>
-              </a:ext>
-            </a:extLst>
-          </p:cNvPr>
-          <p:cNvSpPr/>
-          <p:nvPr/>
-        </p:nvSpPr>
-        <p:spPr>
-          <a:xfrm>
-            <a:off x="2969506" y="2323473"/>
-            <a:ext cx="911279" cy="242345"/>
-          </a:xfrm>
-          <a:prstGeom prst="rect">
-            <a:avLst/>
-          </a:prstGeom>
-          <a:solidFill>
-            <a:schemeClr val="accent1">
-              <a:lumMod val="60000"/>
-              <a:lumOff val="40000"/>
-            </a:schemeClr>
-          </a:solidFill>
-        </p:spPr>
-        <p:style>
-          <a:lnRef idx="2">
-            <a:schemeClr val="accent1">
-              <a:shade val="50000"/>
-            </a:schemeClr>
-          </a:lnRef>
-          <a:fillRef idx="1">
-            <a:schemeClr val="accent1"/>
-          </a:fillRef>
-          <a:effectRef idx="0">
-            <a:schemeClr val="accent1"/>
-          </a:effectRef>
-          <a:fontRef idx="minor">
-            <a:schemeClr val="lt1"/>
-          </a:fontRef>
-        </p:style>
-        <p:txBody>
-          <a:bodyPr rot="0" spcFirstLastPara="0" vertOverflow="overflow" horzOverflow="overflow" vert="horz" wrap="square" lIns="63305" tIns="31652" rIns="63305" bIns="31652" numCol="1" spcCol="0" rtlCol="0" fromWordArt="0" anchor="ctr" anchorCtr="0" forceAA="0" compatLnSpc="1">
-            <a:prstTxWarp prst="textNoShape">
+            </a:prstGeom>
+            <a:noFill/>
+          </p:spPr>
+          <p:txBody>
+            <a:bodyPr wrap="none" rtlCol="0">
+              <a:spAutoFit/>
+            </a:bodyPr>
+            <a:lstStyle/>
+            <a:p>
+              <a:r>
+                <a:rPr lang="pt-BR" sz="1801" dirty="0"/>
+                <a:t>Layout</a:t>
+              </a:r>
+            </a:p>
+          </p:txBody>
+        </p:sp>
+        <p:sp>
+          <p:nvSpPr>
+            <p:cNvPr id="198" name="TextBox 197">
+              <a:extLst>
+                <a:ext uri="{FF2B5EF4-FFF2-40B4-BE49-F238E27FC236}">
+                  <a16:creationId xmlns:a16="http://schemas.microsoft.com/office/drawing/2014/main" id="{5420CCD4-B445-4EFD-99D0-96E69E49AAAB}"/>
+                </a:ext>
+              </a:extLst>
+            </p:cNvPr>
+            <p:cNvSpPr txBox="1"/>
+            <p:nvPr/>
+          </p:nvSpPr>
+          <p:spPr>
+            <a:xfrm>
+              <a:off x="1772595" y="3415155"/>
+              <a:ext cx="794833" cy="369460"/>
+            </a:xfrm>
+            <a:prstGeom prst="rect">
               <a:avLst/>
-            </a:prstTxWarp>
-            <a:noAutofit/>
-          </a:bodyPr>
-          <a:lstStyle/>
-          <a:p>
-            <a:pPr algn="ctr"/>
-            <a:r>
-              <a:rPr lang="pt-BR" sz="1246" dirty="0">
-                <a:ln w="0"/>
-                <a:solidFill>
-                  <a:schemeClr val="tx1"/>
-                </a:solidFill>
-                <a:effectLst>
-                  <a:outerShdw blurRad="38100" dist="19050" dir="2700000" algn="tl" rotWithShape="0">
-                    <a:schemeClr val="dk1">
-                      <a:alpha val="40000"/>
-                    </a:schemeClr>
-                  </a:outerShdw>
-                </a:effectLst>
-              </a:rPr>
-              <a:t>LVS</a:t>
-            </a:r>
-          </a:p>
-        </p:txBody>
-      </p:sp>
-      <p:sp>
-        <p:nvSpPr>
-          <p:cNvPr id="192" name="Rectangle 191">
-            <a:extLst>
-              <a:ext uri="{FF2B5EF4-FFF2-40B4-BE49-F238E27FC236}">
-                <a16:creationId xmlns:a16="http://schemas.microsoft.com/office/drawing/2014/main" id="{9DC06CC8-EB97-4979-9DAC-A818ABB5AC95}"/>
-              </a:ext>
-            </a:extLst>
-          </p:cNvPr>
-          <p:cNvSpPr/>
-          <p:nvPr/>
-        </p:nvSpPr>
-        <p:spPr>
-          <a:xfrm>
-            <a:off x="2977217" y="2610259"/>
-            <a:ext cx="911279" cy="242345"/>
-          </a:xfrm>
-          <a:prstGeom prst="rect">
-            <a:avLst/>
-          </a:prstGeom>
-          <a:solidFill>
-            <a:schemeClr val="accent1">
-              <a:lumMod val="60000"/>
-              <a:lumOff val="40000"/>
-            </a:schemeClr>
-          </a:solidFill>
-        </p:spPr>
-        <p:style>
-          <a:lnRef idx="2">
-            <a:schemeClr val="accent1">
-              <a:shade val="50000"/>
-            </a:schemeClr>
-          </a:lnRef>
-          <a:fillRef idx="1">
-            <a:schemeClr val="accent1"/>
-          </a:fillRef>
-          <a:effectRef idx="0">
-            <a:schemeClr val="accent1"/>
-          </a:effectRef>
-          <a:fontRef idx="minor">
-            <a:schemeClr val="lt1"/>
-          </a:fontRef>
-        </p:style>
-        <p:txBody>
-          <a:bodyPr rot="0" spcFirstLastPara="0" vertOverflow="overflow" horzOverflow="overflow" vert="horz" wrap="square" lIns="63305" tIns="31652" rIns="63305" bIns="31652" numCol="1" spcCol="0" rtlCol="0" fromWordArt="0" anchor="ctr" anchorCtr="0" forceAA="0" compatLnSpc="1">
-            <a:prstTxWarp prst="textNoShape">
+            </a:prstGeom>
+            <a:noFill/>
+          </p:spPr>
+          <p:txBody>
+            <a:bodyPr wrap="none" rtlCol="0">
+              <a:spAutoFit/>
+            </a:bodyPr>
+            <a:lstStyle/>
+            <a:p>
+              <a:r>
+                <a:rPr lang="pt-BR" sz="1801" dirty="0" err="1"/>
+                <a:t>Netlist</a:t>
+              </a:r>
+              <a:endParaRPr lang="pt-BR" sz="1801" dirty="0"/>
+            </a:p>
+          </p:txBody>
+        </p:sp>
+        <p:cxnSp>
+          <p:nvCxnSpPr>
+            <p:cNvPr id="199" name="Straight Arrow Connector 198">
+              <a:extLst>
+                <a:ext uri="{FF2B5EF4-FFF2-40B4-BE49-F238E27FC236}">
+                  <a16:creationId xmlns:a16="http://schemas.microsoft.com/office/drawing/2014/main" id="{2FE20AA8-2CAD-4D6A-B915-0E37603A44D8}"/>
+                </a:ext>
+              </a:extLst>
+            </p:cNvPr>
+            <p:cNvCxnSpPr>
+              <a:cxnSpLocks/>
+              <a:stCxn id="187" idx="2"/>
+              <a:endCxn id="181" idx="0"/>
+            </p:cNvCxnSpPr>
+            <p:nvPr/>
+          </p:nvCxnSpPr>
+          <p:spPr>
+            <a:xfrm>
+              <a:off x="952531" y="1474037"/>
+              <a:ext cx="0" cy="231247"/>
+            </a:xfrm>
+            <a:prstGeom prst="straightConnector1">
               <a:avLst/>
-            </a:prstTxWarp>
-            <a:noAutofit/>
-          </a:bodyPr>
-          <a:lstStyle/>
-          <a:p>
-            <a:pPr algn="ctr"/>
-            <a:r>
-              <a:rPr lang="pt-BR" sz="1246" dirty="0" err="1">
-                <a:ln w="0"/>
-                <a:solidFill>
-                  <a:schemeClr val="tx1"/>
-                </a:solidFill>
-                <a:effectLst>
-                  <a:outerShdw blurRad="38100" dist="19050" dir="2700000" algn="tl" rotWithShape="0">
-                    <a:schemeClr val="dk1">
-                      <a:alpha val="40000"/>
-                    </a:schemeClr>
-                  </a:outerShdw>
-                </a:effectLst>
-              </a:rPr>
-              <a:t>Behaviour</a:t>
-            </a:r>
-            <a:endParaRPr lang="pt-BR" sz="1246" dirty="0"/>
-          </a:p>
-        </p:txBody>
-      </p:sp>
-      <p:sp>
-        <p:nvSpPr>
-          <p:cNvPr id="193" name="Rectangle 192">
-            <a:extLst>
-              <a:ext uri="{FF2B5EF4-FFF2-40B4-BE49-F238E27FC236}">
-                <a16:creationId xmlns:a16="http://schemas.microsoft.com/office/drawing/2014/main" id="{14035736-074B-4DC0-8C3B-0112D1626E4A}"/>
-              </a:ext>
-            </a:extLst>
-          </p:cNvPr>
-          <p:cNvSpPr/>
-          <p:nvPr/>
-        </p:nvSpPr>
-        <p:spPr>
-          <a:xfrm>
-            <a:off x="2754538" y="3491226"/>
-            <a:ext cx="1310640" cy="443851"/>
-          </a:xfrm>
-          <a:prstGeom prst="rect">
-            <a:avLst/>
-          </a:prstGeom>
-        </p:spPr>
-        <p:style>
-          <a:lnRef idx="2">
-            <a:schemeClr val="accent1">
-              <a:shade val="50000"/>
-            </a:schemeClr>
-          </a:lnRef>
-          <a:fillRef idx="1">
-            <a:schemeClr val="accent1"/>
-          </a:fillRef>
-          <a:effectRef idx="0">
-            <a:schemeClr val="accent1"/>
-          </a:effectRef>
-          <a:fontRef idx="minor">
-            <a:schemeClr val="lt1"/>
-          </a:fontRef>
-        </p:style>
-        <p:txBody>
-          <a:bodyPr rot="0" spcFirstLastPara="0" vertOverflow="overflow" horzOverflow="overflow" vert="horz" wrap="square" lIns="63305" tIns="31652" rIns="63305" bIns="31652" numCol="1" spcCol="0" rtlCol="0" fromWordArt="0" anchor="t" anchorCtr="0" forceAA="0" compatLnSpc="1">
-            <a:prstTxWarp prst="textNoShape">
-              <a:avLst/>
-            </a:prstTxWarp>
-            <a:noAutofit/>
-          </a:bodyPr>
-          <a:lstStyle/>
-          <a:p>
-            <a:pPr algn="ctr"/>
-            <a:r>
-              <a:rPr lang="pt-BR" sz="1246" dirty="0" err="1"/>
-              <a:t>Parastic</a:t>
-            </a:r>
-            <a:r>
-              <a:rPr lang="pt-BR" sz="1246" dirty="0"/>
-              <a:t> </a:t>
-            </a:r>
-            <a:r>
-              <a:rPr lang="pt-BR" sz="1246" dirty="0" err="1"/>
-              <a:t>Extraction</a:t>
-            </a:r>
-            <a:endParaRPr lang="pt-BR" sz="1246" dirty="0"/>
-          </a:p>
-        </p:txBody>
-      </p:sp>
-      <p:cxnSp>
-        <p:nvCxnSpPr>
-          <p:cNvPr id="194" name="Straight Arrow Connector 193">
-            <a:extLst>
-              <a:ext uri="{FF2B5EF4-FFF2-40B4-BE49-F238E27FC236}">
-                <a16:creationId xmlns:a16="http://schemas.microsoft.com/office/drawing/2014/main" id="{E19A3BD9-E431-44DF-9F1E-8BDD825F0F5F}"/>
-              </a:ext>
-            </a:extLst>
-          </p:cNvPr>
-          <p:cNvCxnSpPr>
-            <a:cxnSpLocks/>
-          </p:cNvCxnSpPr>
-          <p:nvPr/>
-        </p:nvCxnSpPr>
-        <p:spPr>
-          <a:xfrm flipH="1">
-            <a:off x="3399113" y="3019045"/>
-            <a:ext cx="1" cy="437778"/>
-          </a:xfrm>
-          <a:prstGeom prst="straightConnector1">
-            <a:avLst/>
-          </a:prstGeom>
-          <a:ln w="38100">
-            <a:solidFill>
-              <a:srgbClr val="FF0000"/>
-            </a:solidFill>
-            <a:prstDash val="sysDot"/>
-            <a:tailEnd type="triangle"/>
-          </a:ln>
-        </p:spPr>
-        <p:style>
-          <a:lnRef idx="1">
-            <a:schemeClr val="accent1"/>
-          </a:lnRef>
-          <a:fillRef idx="0">
-            <a:schemeClr val="accent1"/>
-          </a:fillRef>
-          <a:effectRef idx="0">
-            <a:schemeClr val="accent1"/>
-          </a:effectRef>
-          <a:fontRef idx="minor">
-            <a:schemeClr val="tx1"/>
-          </a:fontRef>
-        </p:style>
-      </p:cxnSp>
-      <p:cxnSp>
-        <p:nvCxnSpPr>
-          <p:cNvPr id="195" name="Straight Arrow Connector 194">
-            <a:extLst>
-              <a:ext uri="{FF2B5EF4-FFF2-40B4-BE49-F238E27FC236}">
-                <a16:creationId xmlns:a16="http://schemas.microsoft.com/office/drawing/2014/main" id="{66747757-CB8E-4EAC-A1DA-B690B43D61E2}"/>
-              </a:ext>
-            </a:extLst>
-          </p:cNvPr>
-          <p:cNvCxnSpPr>
-            <a:cxnSpLocks/>
-            <a:endCxn id="186" idx="3"/>
-          </p:cNvCxnSpPr>
-          <p:nvPr/>
-        </p:nvCxnSpPr>
-        <p:spPr>
-          <a:xfrm flipH="1">
-            <a:off x="1615220" y="3703965"/>
-            <a:ext cx="1124361" cy="0"/>
-          </a:xfrm>
-          <a:prstGeom prst="straightConnector1">
-            <a:avLst/>
-          </a:prstGeom>
-          <a:ln w="38100">
-            <a:solidFill>
-              <a:srgbClr val="FF0000"/>
-            </a:solidFill>
-            <a:prstDash val="sysDot"/>
-            <a:tailEnd type="triangle"/>
-          </a:ln>
-        </p:spPr>
-        <p:style>
-          <a:lnRef idx="1">
-            <a:schemeClr val="accent1"/>
-          </a:lnRef>
-          <a:fillRef idx="0">
-            <a:schemeClr val="accent1"/>
-          </a:fillRef>
-          <a:effectRef idx="0">
-            <a:schemeClr val="accent1"/>
-          </a:effectRef>
-          <a:fontRef idx="minor">
-            <a:schemeClr val="tx1"/>
-          </a:fontRef>
-        </p:style>
-      </p:cxnSp>
-      <p:cxnSp>
-        <p:nvCxnSpPr>
-          <p:cNvPr id="196" name="Straight Arrow Connector 195">
-            <a:extLst>
-              <a:ext uri="{FF2B5EF4-FFF2-40B4-BE49-F238E27FC236}">
-                <a16:creationId xmlns:a16="http://schemas.microsoft.com/office/drawing/2014/main" id="{00AEE103-FD75-4406-BA4F-4B723A9C9280}"/>
-              </a:ext>
-            </a:extLst>
-          </p:cNvPr>
-          <p:cNvCxnSpPr>
-            <a:cxnSpLocks/>
-          </p:cNvCxnSpPr>
-          <p:nvPr/>
-        </p:nvCxnSpPr>
-        <p:spPr>
-          <a:xfrm>
-            <a:off x="1630177" y="2397670"/>
-            <a:ext cx="1124361" cy="0"/>
-          </a:xfrm>
-          <a:prstGeom prst="straightConnector1">
-            <a:avLst/>
-          </a:prstGeom>
-          <a:ln w="38100">
-            <a:solidFill>
-              <a:srgbClr val="FF0000"/>
-            </a:solidFill>
-            <a:prstDash val="sysDot"/>
-            <a:tailEnd type="triangle"/>
-          </a:ln>
-        </p:spPr>
-        <p:style>
-          <a:lnRef idx="1">
-            <a:schemeClr val="accent1"/>
-          </a:lnRef>
-          <a:fillRef idx="0">
-            <a:schemeClr val="accent1"/>
-          </a:fillRef>
-          <a:effectRef idx="0">
-            <a:schemeClr val="accent1"/>
-          </a:effectRef>
-          <a:fontRef idx="minor">
-            <a:schemeClr val="tx1"/>
-          </a:fontRef>
-        </p:style>
-      </p:cxnSp>
-      <p:sp>
-        <p:nvSpPr>
-          <p:cNvPr id="197" name="TextBox 196">
-            <a:extLst>
-              <a:ext uri="{FF2B5EF4-FFF2-40B4-BE49-F238E27FC236}">
-                <a16:creationId xmlns:a16="http://schemas.microsoft.com/office/drawing/2014/main" id="{A2EE3788-69D0-4C9C-94BD-23EC93857124}"/>
-              </a:ext>
-            </a:extLst>
-          </p:cNvPr>
-          <p:cNvSpPr txBox="1"/>
-          <p:nvPr/>
-        </p:nvSpPr>
-        <p:spPr>
-          <a:xfrm>
-            <a:off x="1771968" y="2080061"/>
-            <a:ext cx="810863" cy="369460"/>
-          </a:xfrm>
-          <a:prstGeom prst="rect">
-            <a:avLst/>
-          </a:prstGeom>
-          <a:noFill/>
-        </p:spPr>
-        <p:txBody>
-          <a:bodyPr wrap="none" rtlCol="0">
-            <a:spAutoFit/>
-          </a:bodyPr>
-          <a:lstStyle/>
-          <a:p>
-            <a:r>
-              <a:rPr lang="pt-BR" sz="1801" dirty="0"/>
-              <a:t>Layout</a:t>
-            </a:r>
-          </a:p>
-        </p:txBody>
-      </p:sp>
-      <p:sp>
-        <p:nvSpPr>
-          <p:cNvPr id="198" name="TextBox 197">
-            <a:extLst>
-              <a:ext uri="{FF2B5EF4-FFF2-40B4-BE49-F238E27FC236}">
-                <a16:creationId xmlns:a16="http://schemas.microsoft.com/office/drawing/2014/main" id="{5420CCD4-B445-4EFD-99D0-96E69E49AAAB}"/>
-              </a:ext>
-            </a:extLst>
-          </p:cNvPr>
-          <p:cNvSpPr txBox="1"/>
-          <p:nvPr/>
-        </p:nvSpPr>
-        <p:spPr>
-          <a:xfrm>
-            <a:off x="1772595" y="3415155"/>
-            <a:ext cx="794833" cy="369460"/>
-          </a:xfrm>
-          <a:prstGeom prst="rect">
-            <a:avLst/>
-          </a:prstGeom>
-          <a:noFill/>
-        </p:spPr>
-        <p:txBody>
-          <a:bodyPr wrap="none" rtlCol="0">
-            <a:spAutoFit/>
-          </a:bodyPr>
-          <a:lstStyle/>
-          <a:p>
-            <a:r>
-              <a:rPr lang="pt-BR" sz="1801" dirty="0" err="1"/>
-              <a:t>Netlist</a:t>
-            </a:r>
-            <a:endParaRPr lang="pt-BR" sz="1801" dirty="0"/>
-          </a:p>
-        </p:txBody>
-      </p:sp>
-      <p:cxnSp>
-        <p:nvCxnSpPr>
-          <p:cNvPr id="199" name="Straight Arrow Connector 198">
-            <a:extLst>
-              <a:ext uri="{FF2B5EF4-FFF2-40B4-BE49-F238E27FC236}">
-                <a16:creationId xmlns:a16="http://schemas.microsoft.com/office/drawing/2014/main" id="{2FE20AA8-2CAD-4D6A-B915-0E37603A44D8}"/>
-              </a:ext>
-            </a:extLst>
-          </p:cNvPr>
-          <p:cNvCxnSpPr>
-            <a:cxnSpLocks/>
-            <a:stCxn id="187" idx="2"/>
-            <a:endCxn id="181" idx="0"/>
-          </p:cNvCxnSpPr>
-          <p:nvPr/>
-        </p:nvCxnSpPr>
-        <p:spPr>
-          <a:xfrm>
-            <a:off x="952531" y="1474037"/>
-            <a:ext cx="0" cy="231247"/>
-          </a:xfrm>
-          <a:prstGeom prst="straightConnector1">
-            <a:avLst/>
-          </a:prstGeom>
-          <a:ln w="38100">
-            <a:solidFill>
-              <a:srgbClr val="FF0000"/>
-            </a:solidFill>
-            <a:prstDash val="sysDot"/>
-            <a:tailEnd type="triangle"/>
-          </a:ln>
-        </p:spPr>
-        <p:style>
-          <a:lnRef idx="1">
-            <a:schemeClr val="accent1"/>
-          </a:lnRef>
-          <a:fillRef idx="0">
-            <a:schemeClr val="accent1"/>
-          </a:fillRef>
-          <a:effectRef idx="0">
-            <a:schemeClr val="accent1"/>
-          </a:effectRef>
-          <a:fontRef idx="minor">
-            <a:schemeClr val="tx1"/>
-          </a:fontRef>
-        </p:style>
-      </p:cxnSp>
+            </a:prstGeom>
+            <a:ln w="38100">
+              <a:solidFill>
+                <a:srgbClr val="FF0000"/>
+              </a:solidFill>
+              <a:prstDash val="sysDot"/>
+              <a:tailEnd type="triangle"/>
+            </a:ln>
+          </p:spPr>
+          <p:style>
+            <a:lnRef idx="1">
+              <a:schemeClr val="accent1"/>
+            </a:lnRef>
+            <a:fillRef idx="0">
+              <a:schemeClr val="accent1"/>
+            </a:fillRef>
+            <a:effectRef idx="0">
+              <a:schemeClr val="accent1"/>
+            </a:effectRef>
+            <a:fontRef idx="minor">
+              <a:schemeClr val="tx1"/>
+            </a:fontRef>
+          </p:style>
+        </p:cxnSp>
+      </p:grpSp>
     </p:spTree>
     <p:extLst>
       <p:ext uri="{BB962C8B-B14F-4D97-AF65-F5344CB8AC3E}">

</xml_diff>